<commit_message>
Added some more update diagrams
</commit_message>
<xml_diff>
--- a/other/update_analysis.pptx
+++ b/other/update_analysis.pptx
@@ -5,11 +5,16 @@
     <p:sldMasterId id="2147483648" r:id="rId1"/>
   </p:sldMasterIdLst>
   <p:notesMasterIdLst>
-    <p:notesMasterId r:id="rId4"/>
+    <p:notesMasterId r:id="rId9"/>
   </p:notesMasterIdLst>
   <p:sldIdLst>
-    <p:sldId id="257" r:id="rId2"/>
-    <p:sldId id="258" r:id="rId3"/>
+    <p:sldId id="260" r:id="rId2"/>
+    <p:sldId id="257" r:id="rId3"/>
+    <p:sldId id="258" r:id="rId4"/>
+    <p:sldId id="261" r:id="rId5"/>
+    <p:sldId id="259" r:id="rId6"/>
+    <p:sldId id="262" r:id="rId7"/>
+    <p:sldId id="263" r:id="rId8"/>
   </p:sldIdLst>
   <p:sldSz cx="9144000" cy="6858000" type="screen4x3"/>
   <p:notesSz cx="6858000" cy="9144000"/>
@@ -526,7 +531,259 @@
           <a:p>
             <a:fld id="{73B256C8-1484-4FE3-B533-7F15001CF4E6}" type="slidenum">
               <a:rPr lang="en-GB" smtClean="0"/>
-              <a:t>1</a:t>
+              <a:t>2</a:t>
+            </a:fld>
+            <a:endParaRPr lang="en-GB"/>
+          </a:p>
+        </p:txBody>
+      </p:sp>
+    </p:spTree>
+    <p:extLst>
+      <p:ext uri="{BB962C8B-B14F-4D97-AF65-F5344CB8AC3E}">
+        <p14:creationId xmlns:p14="http://schemas.microsoft.com/office/powerpoint/2010/main" val="536892114"/>
+      </p:ext>
+    </p:extLst>
+  </p:cSld>
+  <p:clrMapOvr>
+    <a:masterClrMapping/>
+  </p:clrMapOvr>
+</p:notes>
+</file>
+
+<file path=ppt/notesSlides/notesSlide2.xml><?xml version="1.0" encoding="utf-8"?>
+<p:notes xmlns:a="http://schemas.openxmlformats.org/drawingml/2006/main" xmlns:r="http://schemas.openxmlformats.org/officeDocument/2006/relationships" xmlns:p="http://schemas.openxmlformats.org/presentationml/2006/main">
+  <p:cSld>
+    <p:spTree>
+      <p:nvGrpSpPr>
+        <p:cNvPr id="1" name=""/>
+        <p:cNvGrpSpPr/>
+        <p:nvPr/>
+      </p:nvGrpSpPr>
+      <p:grpSpPr>
+        <a:xfrm>
+          <a:off x="0" y="0"/>
+          <a:ext cx="0" cy="0"/>
+          <a:chOff x="0" y="0"/>
+          <a:chExt cx="0" cy="0"/>
+        </a:xfrm>
+      </p:grpSpPr>
+      <p:sp>
+        <p:nvSpPr>
+          <p:cNvPr id="2" name="Slide Image Placeholder 1"/>
+          <p:cNvSpPr>
+            <a:spLocks noGrp="1" noRot="1" noChangeAspect="1"/>
+          </p:cNvSpPr>
+          <p:nvPr>
+            <p:ph type="sldImg"/>
+          </p:nvPr>
+        </p:nvSpPr>
+        <p:spPr/>
+      </p:sp>
+      <p:sp>
+        <p:nvSpPr>
+          <p:cNvPr id="3" name="Notes Placeholder 2"/>
+          <p:cNvSpPr>
+            <a:spLocks noGrp="1"/>
+          </p:cNvSpPr>
+          <p:nvPr>
+            <p:ph type="body" idx="1"/>
+          </p:nvPr>
+        </p:nvSpPr>
+        <p:spPr/>
+        <p:txBody>
+          <a:bodyPr/>
+          <a:lstStyle/>
+          <a:p>
+            <a:endParaRPr lang="en-GB" dirty="0"/>
+          </a:p>
+        </p:txBody>
+      </p:sp>
+      <p:sp>
+        <p:nvSpPr>
+          <p:cNvPr id="4" name="Slide Number Placeholder 3"/>
+          <p:cNvSpPr>
+            <a:spLocks noGrp="1"/>
+          </p:cNvSpPr>
+          <p:nvPr>
+            <p:ph type="sldNum" sz="quarter" idx="10"/>
+          </p:nvPr>
+        </p:nvSpPr>
+        <p:spPr/>
+        <p:txBody>
+          <a:bodyPr/>
+          <a:lstStyle/>
+          <a:p>
+            <a:fld id="{73B256C8-1484-4FE3-B533-7F15001CF4E6}" type="slidenum">
+              <a:rPr lang="en-GB" smtClean="0"/>
+              <a:t>5</a:t>
+            </a:fld>
+            <a:endParaRPr lang="en-GB"/>
+          </a:p>
+        </p:txBody>
+      </p:sp>
+    </p:spTree>
+    <p:extLst>
+      <p:ext uri="{BB962C8B-B14F-4D97-AF65-F5344CB8AC3E}">
+        <p14:creationId xmlns:p14="http://schemas.microsoft.com/office/powerpoint/2010/main" val="536892114"/>
+      </p:ext>
+    </p:extLst>
+  </p:cSld>
+  <p:clrMapOvr>
+    <a:masterClrMapping/>
+  </p:clrMapOvr>
+</p:notes>
+</file>
+
+<file path=ppt/notesSlides/notesSlide3.xml><?xml version="1.0" encoding="utf-8"?>
+<p:notes xmlns:a="http://schemas.openxmlformats.org/drawingml/2006/main" xmlns:r="http://schemas.openxmlformats.org/officeDocument/2006/relationships" xmlns:p="http://schemas.openxmlformats.org/presentationml/2006/main">
+  <p:cSld>
+    <p:spTree>
+      <p:nvGrpSpPr>
+        <p:cNvPr id="1" name=""/>
+        <p:cNvGrpSpPr/>
+        <p:nvPr/>
+      </p:nvGrpSpPr>
+      <p:grpSpPr>
+        <a:xfrm>
+          <a:off x="0" y="0"/>
+          <a:ext cx="0" cy="0"/>
+          <a:chOff x="0" y="0"/>
+          <a:chExt cx="0" cy="0"/>
+        </a:xfrm>
+      </p:grpSpPr>
+      <p:sp>
+        <p:nvSpPr>
+          <p:cNvPr id="2" name="Slide Image Placeholder 1"/>
+          <p:cNvSpPr>
+            <a:spLocks noGrp="1" noRot="1" noChangeAspect="1"/>
+          </p:cNvSpPr>
+          <p:nvPr>
+            <p:ph type="sldImg"/>
+          </p:nvPr>
+        </p:nvSpPr>
+        <p:spPr/>
+      </p:sp>
+      <p:sp>
+        <p:nvSpPr>
+          <p:cNvPr id="3" name="Notes Placeholder 2"/>
+          <p:cNvSpPr>
+            <a:spLocks noGrp="1"/>
+          </p:cNvSpPr>
+          <p:nvPr>
+            <p:ph type="body" idx="1"/>
+          </p:nvPr>
+        </p:nvSpPr>
+        <p:spPr/>
+        <p:txBody>
+          <a:bodyPr/>
+          <a:lstStyle/>
+          <a:p>
+            <a:endParaRPr lang="en-GB" dirty="0"/>
+          </a:p>
+        </p:txBody>
+      </p:sp>
+      <p:sp>
+        <p:nvSpPr>
+          <p:cNvPr id="4" name="Slide Number Placeholder 3"/>
+          <p:cNvSpPr>
+            <a:spLocks noGrp="1"/>
+          </p:cNvSpPr>
+          <p:nvPr>
+            <p:ph type="sldNum" sz="quarter" idx="10"/>
+          </p:nvPr>
+        </p:nvSpPr>
+        <p:spPr/>
+        <p:txBody>
+          <a:bodyPr/>
+          <a:lstStyle/>
+          <a:p>
+            <a:fld id="{73B256C8-1484-4FE3-B533-7F15001CF4E6}" type="slidenum">
+              <a:rPr lang="en-GB" smtClean="0"/>
+              <a:t>6</a:t>
+            </a:fld>
+            <a:endParaRPr lang="en-GB"/>
+          </a:p>
+        </p:txBody>
+      </p:sp>
+    </p:spTree>
+    <p:extLst>
+      <p:ext uri="{BB962C8B-B14F-4D97-AF65-F5344CB8AC3E}">
+        <p14:creationId xmlns:p14="http://schemas.microsoft.com/office/powerpoint/2010/main" val="536892114"/>
+      </p:ext>
+    </p:extLst>
+  </p:cSld>
+  <p:clrMapOvr>
+    <a:masterClrMapping/>
+  </p:clrMapOvr>
+</p:notes>
+</file>
+
+<file path=ppt/notesSlides/notesSlide4.xml><?xml version="1.0" encoding="utf-8"?>
+<p:notes xmlns:a="http://schemas.openxmlformats.org/drawingml/2006/main" xmlns:r="http://schemas.openxmlformats.org/officeDocument/2006/relationships" xmlns:p="http://schemas.openxmlformats.org/presentationml/2006/main">
+  <p:cSld>
+    <p:spTree>
+      <p:nvGrpSpPr>
+        <p:cNvPr id="1" name=""/>
+        <p:cNvGrpSpPr/>
+        <p:nvPr/>
+      </p:nvGrpSpPr>
+      <p:grpSpPr>
+        <a:xfrm>
+          <a:off x="0" y="0"/>
+          <a:ext cx="0" cy="0"/>
+          <a:chOff x="0" y="0"/>
+          <a:chExt cx="0" cy="0"/>
+        </a:xfrm>
+      </p:grpSpPr>
+      <p:sp>
+        <p:nvSpPr>
+          <p:cNvPr id="2" name="Slide Image Placeholder 1"/>
+          <p:cNvSpPr>
+            <a:spLocks noGrp="1" noRot="1" noChangeAspect="1"/>
+          </p:cNvSpPr>
+          <p:nvPr>
+            <p:ph type="sldImg"/>
+          </p:nvPr>
+        </p:nvSpPr>
+        <p:spPr/>
+      </p:sp>
+      <p:sp>
+        <p:nvSpPr>
+          <p:cNvPr id="3" name="Notes Placeholder 2"/>
+          <p:cNvSpPr>
+            <a:spLocks noGrp="1"/>
+          </p:cNvSpPr>
+          <p:nvPr>
+            <p:ph type="body" idx="1"/>
+          </p:nvPr>
+        </p:nvSpPr>
+        <p:spPr/>
+        <p:txBody>
+          <a:bodyPr/>
+          <a:lstStyle/>
+          <a:p>
+            <a:endParaRPr lang="en-GB" dirty="0"/>
+          </a:p>
+        </p:txBody>
+      </p:sp>
+      <p:sp>
+        <p:nvSpPr>
+          <p:cNvPr id="4" name="Slide Number Placeholder 3"/>
+          <p:cNvSpPr>
+            <a:spLocks noGrp="1"/>
+          </p:cNvSpPr>
+          <p:nvPr>
+            <p:ph type="sldNum" sz="quarter" idx="10"/>
+          </p:nvPr>
+        </p:nvSpPr>
+        <p:spPr/>
+        <p:txBody>
+          <a:bodyPr/>
+          <a:lstStyle/>
+          <a:p>
+            <a:fld id="{73B256C8-1484-4FE3-B533-7F15001CF4E6}" type="slidenum">
+              <a:rPr lang="en-GB" smtClean="0"/>
+              <a:t>7</a:t>
             </a:fld>
             <a:endParaRPr lang="en-GB"/>
           </a:p>
@@ -3535,601 +3792,50 @@
       </p:grpSpPr>
       <p:sp>
         <p:nvSpPr>
-          <p:cNvPr id="4" name="TextBox 3"/>
-          <p:cNvSpPr txBox="1"/>
-          <p:nvPr/>
-        </p:nvSpPr>
-        <p:spPr>
-          <a:xfrm>
-            <a:off x="1907704" y="1819710"/>
-            <a:ext cx="1800200" cy="369332"/>
-          </a:xfrm>
-          <a:prstGeom prst="rect">
-            <a:avLst/>
-          </a:prstGeom>
-          <a:noFill/>
-        </p:spPr>
-        <p:txBody>
-          <a:bodyPr wrap="square" rtlCol="0">
-            <a:spAutoFit/>
-          </a:bodyPr>
-          <a:lstStyle/>
-          <a:p>
-            <a:r>
-              <a:rPr lang="en-GB" b="1" dirty="0" smtClean="0"/>
-              <a:t>Frame start time</a:t>
-            </a:r>
-            <a:endParaRPr lang="en-GB" b="1" dirty="0"/>
-          </a:p>
-        </p:txBody>
-      </p:sp>
-      <p:sp>
-        <p:nvSpPr>
-          <p:cNvPr id="5" name="TextBox 4"/>
-          <p:cNvSpPr txBox="1"/>
-          <p:nvPr/>
-        </p:nvSpPr>
-        <p:spPr>
-          <a:xfrm>
-            <a:off x="4932040" y="1819710"/>
-            <a:ext cx="1800200" cy="369332"/>
-          </a:xfrm>
-          <a:prstGeom prst="rect">
-            <a:avLst/>
-          </a:prstGeom>
-          <a:noFill/>
-        </p:spPr>
-        <p:txBody>
-          <a:bodyPr wrap="square" rtlCol="0">
-            <a:spAutoFit/>
-          </a:bodyPr>
-          <a:lstStyle/>
-          <a:p>
-            <a:r>
-              <a:rPr lang="en-GB" b="1" dirty="0" smtClean="0"/>
-              <a:t>Frame end time</a:t>
-            </a:r>
-            <a:endParaRPr lang="en-GB" b="1" dirty="0"/>
-          </a:p>
-        </p:txBody>
-      </p:sp>
-      <p:cxnSp>
-        <p:nvCxnSpPr>
-          <p:cNvPr id="7" name="Straight Connector 6"/>
-          <p:cNvCxnSpPr>
-            <a:stCxn id="4" idx="2"/>
-          </p:cNvCxnSpPr>
-          <p:nvPr/>
-        </p:nvCxnSpPr>
-        <p:spPr>
-          <a:xfrm>
-            <a:off x="2807804" y="2189042"/>
-            <a:ext cx="0" cy="3976262"/>
-          </a:xfrm>
-          <a:prstGeom prst="line">
-            <a:avLst/>
-          </a:prstGeom>
-          <a:ln w="28575"/>
-        </p:spPr>
-        <p:style>
-          <a:lnRef idx="1">
-            <a:schemeClr val="dk1"/>
-          </a:lnRef>
-          <a:fillRef idx="0">
-            <a:schemeClr val="dk1"/>
-          </a:fillRef>
-          <a:effectRef idx="0">
-            <a:schemeClr val="dk1"/>
-          </a:effectRef>
-          <a:fontRef idx="minor">
-            <a:schemeClr val="tx1"/>
-          </a:fontRef>
-        </p:style>
-      </p:cxnSp>
-      <p:cxnSp>
-        <p:nvCxnSpPr>
-          <p:cNvPr id="9" name="Straight Connector 8"/>
-          <p:cNvCxnSpPr>
-            <a:stCxn id="5" idx="2"/>
-          </p:cNvCxnSpPr>
-          <p:nvPr/>
-        </p:nvCxnSpPr>
-        <p:spPr>
-          <a:xfrm>
-            <a:off x="5832140" y="2189042"/>
-            <a:ext cx="0" cy="3976262"/>
-          </a:xfrm>
-          <a:prstGeom prst="line">
-            <a:avLst/>
-          </a:prstGeom>
-          <a:ln w="28575"/>
-        </p:spPr>
-        <p:style>
-          <a:lnRef idx="1">
-            <a:schemeClr val="dk1"/>
-          </a:lnRef>
-          <a:fillRef idx="0">
-            <a:schemeClr val="dk1"/>
-          </a:fillRef>
-          <a:effectRef idx="0">
-            <a:schemeClr val="dk1"/>
-          </a:effectRef>
-          <a:fontRef idx="minor">
-            <a:schemeClr val="tx1"/>
-          </a:fontRef>
-        </p:style>
-      </p:cxnSp>
-      <p:sp>
-        <p:nvSpPr>
-          <p:cNvPr id="10" name="TextBox 9"/>
-          <p:cNvSpPr txBox="1"/>
-          <p:nvPr/>
-        </p:nvSpPr>
-        <p:spPr>
-          <a:xfrm>
-            <a:off x="755576" y="2420888"/>
-            <a:ext cx="1872208" cy="3970318"/>
-          </a:xfrm>
-          <a:prstGeom prst="rect">
-            <a:avLst/>
-          </a:prstGeom>
-          <a:noFill/>
-        </p:spPr>
-        <p:txBody>
-          <a:bodyPr wrap="square" rtlCol="0">
-            <a:spAutoFit/>
-          </a:bodyPr>
+          <p:cNvPr id="4" name="Title 3"/>
+          <p:cNvSpPr>
+            <a:spLocks noGrp="1"/>
+          </p:cNvSpPr>
+          <p:nvPr>
+            <p:ph type="title"/>
+          </p:nvPr>
+        </p:nvSpPr>
+        <p:spPr/>
+        <p:txBody>
+          <a:bodyPr/>
           <a:lstStyle/>
           <a:p>
             <a:r>
               <a:rPr lang="en-GB" dirty="0" smtClean="0"/>
-              <a:t>Animation</a:t>
-            </a:r>
-          </a:p>
-          <a:p>
-            <a:endParaRPr lang="en-GB" dirty="0" smtClean="0"/>
-          </a:p>
-          <a:p>
-            <a:endParaRPr lang="en-GB" dirty="0" smtClean="0"/>
-          </a:p>
-          <a:p>
-            <a:r>
-              <a:rPr lang="en-GB" dirty="0" smtClean="0"/>
-              <a:t>Physics</a:t>
-            </a:r>
-          </a:p>
-          <a:p>
-            <a:endParaRPr lang="en-GB" dirty="0" smtClean="0"/>
-          </a:p>
-          <a:p>
-            <a:endParaRPr lang="en-GB" dirty="0" smtClean="0"/>
-          </a:p>
-          <a:p>
-            <a:r>
-              <a:rPr lang="en-GB" dirty="0" smtClean="0"/>
-              <a:t>Gameplay</a:t>
-            </a:r>
-          </a:p>
-          <a:p>
+              <a:t>System example</a:t>
+            </a:r>
             <a:endParaRPr lang="en-GB" dirty="0"/>
           </a:p>
-          <a:p>
-            <a:endParaRPr lang="en-GB" dirty="0" smtClean="0"/>
-          </a:p>
-          <a:p>
-            <a:endParaRPr lang="en-GB" dirty="0" smtClean="0"/>
-          </a:p>
-          <a:p>
-            <a:endParaRPr lang="en-GB" dirty="0" smtClean="0"/>
-          </a:p>
-          <a:p>
-            <a:endParaRPr lang="en-GB" dirty="0"/>
-          </a:p>
-          <a:p>
-            <a:r>
-              <a:rPr lang="en-GB" dirty="0" smtClean="0"/>
-              <a:t>Render</a:t>
-            </a:r>
-          </a:p>
-          <a:p>
-            <a:endParaRPr lang="en-GB" dirty="0" smtClean="0"/>
-          </a:p>
-        </p:txBody>
-      </p:sp>
-      <p:sp>
-        <p:nvSpPr>
-          <p:cNvPr id="11" name="Striped Right Arrow 10"/>
-          <p:cNvSpPr/>
-          <p:nvPr/>
-        </p:nvSpPr>
-        <p:spPr>
-          <a:xfrm>
-            <a:off x="2807804" y="2420888"/>
-            <a:ext cx="3024336" cy="432048"/>
-          </a:xfrm>
-          <a:prstGeom prst="stripedRightArrow">
-            <a:avLst/>
-          </a:prstGeom>
-        </p:spPr>
-        <p:style>
-          <a:lnRef idx="1">
-            <a:schemeClr val="dk1"/>
-          </a:lnRef>
-          <a:fillRef idx="2">
-            <a:schemeClr val="dk1"/>
-          </a:fillRef>
-          <a:effectRef idx="1">
-            <a:schemeClr val="dk1"/>
-          </a:effectRef>
-          <a:fontRef idx="minor">
-            <a:schemeClr val="dk1"/>
-          </a:fontRef>
-        </p:style>
-        <p:txBody>
-          <a:bodyPr rtlCol="0" anchor="ctr"/>
-          <a:lstStyle/>
-          <a:p>
-            <a:pPr algn="ctr"/>
-            <a:endParaRPr lang="en-GB"/>
-          </a:p>
-        </p:txBody>
-      </p:sp>
-      <p:sp>
-        <p:nvSpPr>
-          <p:cNvPr id="12" name="Striped Right Arrow 11"/>
-          <p:cNvSpPr/>
-          <p:nvPr/>
-        </p:nvSpPr>
-        <p:spPr>
-          <a:xfrm>
-            <a:off x="2708244" y="3212976"/>
-            <a:ext cx="1831978" cy="432048"/>
-          </a:xfrm>
-          <a:prstGeom prst="stripedRightArrow">
-            <a:avLst/>
-          </a:prstGeom>
-        </p:spPr>
-        <p:style>
-          <a:lnRef idx="1">
-            <a:schemeClr val="dk1"/>
-          </a:lnRef>
-          <a:fillRef idx="2">
-            <a:schemeClr val="dk1"/>
-          </a:fillRef>
-          <a:effectRef idx="1">
-            <a:schemeClr val="dk1"/>
-          </a:effectRef>
-          <a:fontRef idx="minor">
-            <a:schemeClr val="dk1"/>
-          </a:fontRef>
-        </p:style>
-        <p:txBody>
-          <a:bodyPr rtlCol="0" anchor="ctr"/>
-          <a:lstStyle/>
-          <a:p>
-            <a:pPr algn="ctr"/>
-            <a:endParaRPr lang="en-GB"/>
-          </a:p>
-        </p:txBody>
-      </p:sp>
-      <p:sp>
-        <p:nvSpPr>
-          <p:cNvPr id="13" name="Striped Right Arrow 12"/>
-          <p:cNvSpPr/>
-          <p:nvPr/>
-        </p:nvSpPr>
-        <p:spPr>
-          <a:xfrm>
-            <a:off x="4540222" y="3212976"/>
-            <a:ext cx="1831978" cy="432048"/>
-          </a:xfrm>
-          <a:prstGeom prst="stripedRightArrow">
-            <a:avLst/>
-          </a:prstGeom>
-        </p:spPr>
-        <p:style>
-          <a:lnRef idx="1">
-            <a:schemeClr val="dk1"/>
-          </a:lnRef>
-          <a:fillRef idx="2">
-            <a:schemeClr val="dk1"/>
-          </a:fillRef>
-          <a:effectRef idx="1">
-            <a:schemeClr val="dk1"/>
-          </a:effectRef>
-          <a:fontRef idx="minor">
-            <a:schemeClr val="dk1"/>
-          </a:fontRef>
-        </p:style>
-        <p:txBody>
-          <a:bodyPr rtlCol="0" anchor="ctr"/>
-          <a:lstStyle/>
-          <a:p>
-            <a:pPr algn="ctr"/>
-            <a:endParaRPr lang="en-GB"/>
-          </a:p>
-        </p:txBody>
-      </p:sp>
-      <p:sp>
-        <p:nvSpPr>
-          <p:cNvPr id="14" name="Striped Right Arrow 13"/>
-          <p:cNvSpPr/>
-          <p:nvPr/>
-        </p:nvSpPr>
-        <p:spPr>
-          <a:xfrm>
-            <a:off x="2806114" y="4077072"/>
-            <a:ext cx="3024336" cy="432048"/>
-          </a:xfrm>
-          <a:prstGeom prst="stripedRightArrow">
-            <a:avLst/>
-          </a:prstGeom>
-        </p:spPr>
-        <p:style>
-          <a:lnRef idx="1">
-            <a:schemeClr val="dk1"/>
-          </a:lnRef>
-          <a:fillRef idx="2">
-            <a:schemeClr val="dk1"/>
-          </a:fillRef>
-          <a:effectRef idx="1">
-            <a:schemeClr val="dk1"/>
-          </a:effectRef>
-          <a:fontRef idx="minor">
-            <a:schemeClr val="dk1"/>
-          </a:fontRef>
-        </p:style>
-        <p:txBody>
-          <a:bodyPr rtlCol="0" anchor="ctr"/>
-          <a:lstStyle/>
-          <a:p>
-            <a:pPr algn="ctr"/>
-            <a:endParaRPr lang="en-GB"/>
-          </a:p>
-        </p:txBody>
-      </p:sp>
-      <p:cxnSp>
-        <p:nvCxnSpPr>
-          <p:cNvPr id="17" name="Straight Arrow Connector 16"/>
-          <p:cNvCxnSpPr>
-            <a:stCxn id="11" idx="3"/>
-            <a:endCxn id="12" idx="1"/>
-          </p:cNvCxnSpPr>
-          <p:nvPr/>
-        </p:nvCxnSpPr>
-        <p:spPr>
-          <a:xfrm flipH="1">
-            <a:off x="2708244" y="2636912"/>
-            <a:ext cx="3123896" cy="792088"/>
-          </a:xfrm>
-          <a:prstGeom prst="straightConnector1">
-            <a:avLst/>
-          </a:prstGeom>
-          <a:ln w="57150">
-            <a:solidFill>
-              <a:srgbClr val="FF0000"/>
-            </a:solidFill>
-            <a:headEnd type="none" w="med" len="med"/>
-            <a:tailEnd type="triangle" w="med" len="med"/>
-          </a:ln>
-        </p:spPr>
-        <p:style>
-          <a:lnRef idx="1">
-            <a:schemeClr val="accent1"/>
-          </a:lnRef>
-          <a:fillRef idx="0">
-            <a:schemeClr val="accent1"/>
-          </a:fillRef>
-          <a:effectRef idx="0">
-            <a:schemeClr val="accent1"/>
-          </a:effectRef>
-          <a:fontRef idx="minor">
-            <a:schemeClr val="tx1"/>
-          </a:fontRef>
-        </p:style>
-      </p:cxnSp>
-      <p:cxnSp>
-        <p:nvCxnSpPr>
-          <p:cNvPr id="18" name="Straight Arrow Connector 17"/>
-          <p:cNvCxnSpPr>
-            <a:stCxn id="11" idx="3"/>
-            <a:endCxn id="13" idx="1"/>
-          </p:cNvCxnSpPr>
-          <p:nvPr/>
-        </p:nvCxnSpPr>
-        <p:spPr>
-          <a:xfrm flipH="1">
-            <a:off x="4540222" y="2636912"/>
-            <a:ext cx="1291918" cy="792088"/>
-          </a:xfrm>
-          <a:prstGeom prst="straightConnector1">
-            <a:avLst/>
-          </a:prstGeom>
-          <a:ln w="57150">
-            <a:solidFill>
-              <a:srgbClr val="FF0000"/>
-            </a:solidFill>
-            <a:headEnd type="none" w="med" len="med"/>
-            <a:tailEnd type="triangle" w="med" len="med"/>
-          </a:ln>
-        </p:spPr>
-        <p:style>
-          <a:lnRef idx="1">
-            <a:schemeClr val="accent1"/>
-          </a:lnRef>
-          <a:fillRef idx="0">
-            <a:schemeClr val="accent1"/>
-          </a:fillRef>
-          <a:effectRef idx="0">
-            <a:schemeClr val="accent1"/>
-          </a:effectRef>
-          <a:fontRef idx="minor">
-            <a:schemeClr val="tx1"/>
-          </a:fontRef>
-        </p:style>
-      </p:cxnSp>
-      <p:cxnSp>
-        <p:nvCxnSpPr>
-          <p:cNvPr id="22" name="Straight Arrow Connector 21"/>
-          <p:cNvCxnSpPr>
-            <a:stCxn id="14" idx="1"/>
-            <a:endCxn id="12" idx="1"/>
-          </p:cNvCxnSpPr>
-          <p:nvPr/>
-        </p:nvCxnSpPr>
-        <p:spPr>
-          <a:xfrm flipH="1" flipV="1">
-            <a:off x="2708244" y="3429000"/>
-            <a:ext cx="97870" cy="864096"/>
-          </a:xfrm>
-          <a:prstGeom prst="straightConnector1">
-            <a:avLst/>
-          </a:prstGeom>
-          <a:ln w="57150">
-            <a:solidFill>
-              <a:srgbClr val="FF0000"/>
-            </a:solidFill>
-            <a:headEnd type="none" w="med" len="med"/>
-            <a:tailEnd type="triangle" w="med" len="med"/>
-          </a:ln>
-        </p:spPr>
-        <p:style>
-          <a:lnRef idx="1">
-            <a:schemeClr val="accent1"/>
-          </a:lnRef>
-          <a:fillRef idx="0">
-            <a:schemeClr val="accent1"/>
-          </a:fillRef>
-          <a:effectRef idx="0">
-            <a:schemeClr val="accent1"/>
-          </a:effectRef>
-          <a:fontRef idx="minor">
-            <a:schemeClr val="tx1"/>
-          </a:fontRef>
-        </p:style>
-      </p:cxnSp>
-      <p:cxnSp>
-        <p:nvCxnSpPr>
-          <p:cNvPr id="25" name="Straight Arrow Connector 24"/>
-          <p:cNvCxnSpPr>
-            <a:stCxn id="14" idx="1"/>
-            <a:endCxn id="13" idx="1"/>
-          </p:cNvCxnSpPr>
-          <p:nvPr/>
-        </p:nvCxnSpPr>
-        <p:spPr>
-          <a:xfrm flipV="1">
-            <a:off x="2806114" y="3429000"/>
-            <a:ext cx="1734108" cy="864096"/>
-          </a:xfrm>
-          <a:prstGeom prst="straightConnector1">
-            <a:avLst/>
-          </a:prstGeom>
-          <a:ln w="57150">
-            <a:solidFill>
-              <a:srgbClr val="FF0000"/>
-            </a:solidFill>
-            <a:headEnd type="none" w="med" len="med"/>
-            <a:tailEnd type="triangle" w="med" len="med"/>
-          </a:ln>
-        </p:spPr>
-        <p:style>
-          <a:lnRef idx="1">
-            <a:schemeClr val="accent1"/>
-          </a:lnRef>
-          <a:fillRef idx="0">
-            <a:schemeClr val="accent1"/>
-          </a:fillRef>
-          <a:effectRef idx="0">
-            <a:schemeClr val="accent1"/>
-          </a:effectRef>
-          <a:fontRef idx="minor">
-            <a:schemeClr val="tx1"/>
-          </a:fontRef>
-        </p:style>
-      </p:cxnSp>
-      <p:sp>
-        <p:nvSpPr>
-          <p:cNvPr id="32" name="Striped Right Arrow 31"/>
-          <p:cNvSpPr/>
-          <p:nvPr/>
-        </p:nvSpPr>
-        <p:spPr>
-          <a:xfrm>
-            <a:off x="5832140" y="5714817"/>
-            <a:ext cx="3024336" cy="432048"/>
-          </a:xfrm>
-          <a:prstGeom prst="stripedRightArrow">
-            <a:avLst/>
-          </a:prstGeom>
-        </p:spPr>
-        <p:style>
-          <a:lnRef idx="1">
-            <a:schemeClr val="dk1"/>
-          </a:lnRef>
-          <a:fillRef idx="2">
-            <a:schemeClr val="dk1"/>
-          </a:fillRef>
-          <a:effectRef idx="1">
-            <a:schemeClr val="dk1"/>
-          </a:effectRef>
-          <a:fontRef idx="minor">
-            <a:schemeClr val="dk1"/>
-          </a:fontRef>
-        </p:style>
-        <p:txBody>
-          <a:bodyPr rtlCol="0" anchor="ctr"/>
-          <a:lstStyle/>
-          <a:p>
-            <a:pPr algn="ctr"/>
-            <a:endParaRPr lang="en-GB"/>
-          </a:p>
-        </p:txBody>
-      </p:sp>
-      <p:cxnSp>
-        <p:nvCxnSpPr>
-          <p:cNvPr id="33" name="Straight Arrow Connector 32"/>
-          <p:cNvCxnSpPr>
-            <a:stCxn id="13" idx="3"/>
-            <a:endCxn id="32" idx="1"/>
-          </p:cNvCxnSpPr>
-          <p:nvPr/>
-        </p:nvCxnSpPr>
-        <p:spPr>
-          <a:xfrm flipH="1">
-            <a:off x="5832140" y="3429000"/>
-            <a:ext cx="540060" cy="2501841"/>
-          </a:xfrm>
-          <a:prstGeom prst="straightConnector1">
-            <a:avLst/>
-          </a:prstGeom>
-          <a:ln w="57150">
-            <a:solidFill>
-              <a:srgbClr val="FF0000"/>
-            </a:solidFill>
-            <a:headEnd type="none" w="med" len="med"/>
-            <a:tailEnd type="triangle" w="med" len="med"/>
-          </a:ln>
-        </p:spPr>
-        <p:style>
-          <a:lnRef idx="1">
-            <a:schemeClr val="accent1"/>
-          </a:lnRef>
-          <a:fillRef idx="0">
-            <a:schemeClr val="accent1"/>
-          </a:fillRef>
-          <a:effectRef idx="0">
-            <a:schemeClr val="accent1"/>
-          </a:effectRef>
-          <a:fontRef idx="minor">
-            <a:schemeClr val="tx1"/>
-          </a:fontRef>
-        </p:style>
-      </p:cxnSp>
+        </p:txBody>
+      </p:sp>
+      <p:sp>
+        <p:nvSpPr>
+          <p:cNvPr id="5" name="Text Placeholder 4"/>
+          <p:cNvSpPr>
+            <a:spLocks noGrp="1"/>
+          </p:cNvSpPr>
+          <p:nvPr>
+            <p:ph type="body" idx="1"/>
+          </p:nvPr>
+        </p:nvSpPr>
+        <p:spPr/>
+        <p:txBody>
+          <a:bodyPr/>
+          <a:lstStyle/>
+          <a:p>
+            <a:endParaRPr lang="en-GB"/>
+          </a:p>
+        </p:txBody>
+      </p:sp>
     </p:spTree>
     <p:extLst>
       <p:ext uri="{BB962C8B-B14F-4D97-AF65-F5344CB8AC3E}">
-        <p14:creationId xmlns:p14="http://schemas.microsoft.com/office/powerpoint/2010/main" val="2291024588"/>
+        <p14:creationId xmlns:p14="http://schemas.microsoft.com/office/powerpoint/2010/main" val="2732452655"/>
       </p:ext>
     </p:extLst>
   </p:cSld>
@@ -4298,6 +4004,664 @@
         <p:spPr>
           <a:xfrm>
             <a:off x="755576" y="2420888"/>
+            <a:ext cx="1872208" cy="3970318"/>
+          </a:xfrm>
+          <a:prstGeom prst="rect">
+            <a:avLst/>
+          </a:prstGeom>
+          <a:noFill/>
+        </p:spPr>
+        <p:txBody>
+          <a:bodyPr wrap="square" rtlCol="0">
+            <a:spAutoFit/>
+          </a:bodyPr>
+          <a:lstStyle/>
+          <a:p>
+            <a:r>
+              <a:rPr lang="en-GB" dirty="0" smtClean="0"/>
+              <a:t>Animation</a:t>
+            </a:r>
+          </a:p>
+          <a:p>
+            <a:endParaRPr lang="en-GB" dirty="0" smtClean="0"/>
+          </a:p>
+          <a:p>
+            <a:endParaRPr lang="en-GB" dirty="0" smtClean="0"/>
+          </a:p>
+          <a:p>
+            <a:r>
+              <a:rPr lang="en-GB" dirty="0" smtClean="0"/>
+              <a:t>Physics</a:t>
+            </a:r>
+          </a:p>
+          <a:p>
+            <a:endParaRPr lang="en-GB" dirty="0" smtClean="0"/>
+          </a:p>
+          <a:p>
+            <a:endParaRPr lang="en-GB" dirty="0" smtClean="0"/>
+          </a:p>
+          <a:p>
+            <a:r>
+              <a:rPr lang="en-GB" dirty="0" smtClean="0"/>
+              <a:t>Gameplay</a:t>
+            </a:r>
+          </a:p>
+          <a:p>
+            <a:endParaRPr lang="en-GB" dirty="0"/>
+          </a:p>
+          <a:p>
+            <a:endParaRPr lang="en-GB" dirty="0" smtClean="0"/>
+          </a:p>
+          <a:p>
+            <a:endParaRPr lang="en-GB" dirty="0" smtClean="0"/>
+          </a:p>
+          <a:p>
+            <a:endParaRPr lang="en-GB" dirty="0" smtClean="0"/>
+          </a:p>
+          <a:p>
+            <a:endParaRPr lang="en-GB" dirty="0"/>
+          </a:p>
+          <a:p>
+            <a:r>
+              <a:rPr lang="en-GB" dirty="0" smtClean="0"/>
+              <a:t>Render</a:t>
+            </a:r>
+          </a:p>
+          <a:p>
+            <a:endParaRPr lang="en-GB" dirty="0" smtClean="0"/>
+          </a:p>
+        </p:txBody>
+      </p:sp>
+      <p:sp>
+        <p:nvSpPr>
+          <p:cNvPr id="11" name="Striped Right Arrow 10"/>
+          <p:cNvSpPr/>
+          <p:nvPr/>
+        </p:nvSpPr>
+        <p:spPr>
+          <a:xfrm>
+            <a:off x="2807804" y="2420888"/>
+            <a:ext cx="3024336" cy="432048"/>
+          </a:xfrm>
+          <a:prstGeom prst="stripedRightArrow">
+            <a:avLst/>
+          </a:prstGeom>
+        </p:spPr>
+        <p:style>
+          <a:lnRef idx="1">
+            <a:schemeClr val="dk1"/>
+          </a:lnRef>
+          <a:fillRef idx="2">
+            <a:schemeClr val="dk1"/>
+          </a:fillRef>
+          <a:effectRef idx="1">
+            <a:schemeClr val="dk1"/>
+          </a:effectRef>
+          <a:fontRef idx="minor">
+            <a:schemeClr val="dk1"/>
+          </a:fontRef>
+        </p:style>
+        <p:txBody>
+          <a:bodyPr rtlCol="0" anchor="ctr"/>
+          <a:lstStyle/>
+          <a:p>
+            <a:pPr algn="ctr"/>
+            <a:endParaRPr lang="en-GB"/>
+          </a:p>
+        </p:txBody>
+      </p:sp>
+      <p:sp>
+        <p:nvSpPr>
+          <p:cNvPr id="12" name="Striped Right Arrow 11"/>
+          <p:cNvSpPr/>
+          <p:nvPr/>
+        </p:nvSpPr>
+        <p:spPr>
+          <a:xfrm>
+            <a:off x="2708244" y="3212976"/>
+            <a:ext cx="1831978" cy="432048"/>
+          </a:xfrm>
+          <a:prstGeom prst="stripedRightArrow">
+            <a:avLst/>
+          </a:prstGeom>
+        </p:spPr>
+        <p:style>
+          <a:lnRef idx="1">
+            <a:schemeClr val="dk1"/>
+          </a:lnRef>
+          <a:fillRef idx="2">
+            <a:schemeClr val="dk1"/>
+          </a:fillRef>
+          <a:effectRef idx="1">
+            <a:schemeClr val="dk1"/>
+          </a:effectRef>
+          <a:fontRef idx="minor">
+            <a:schemeClr val="dk1"/>
+          </a:fontRef>
+        </p:style>
+        <p:txBody>
+          <a:bodyPr rtlCol="0" anchor="ctr"/>
+          <a:lstStyle/>
+          <a:p>
+            <a:pPr algn="ctr"/>
+            <a:endParaRPr lang="en-GB"/>
+          </a:p>
+        </p:txBody>
+      </p:sp>
+      <p:sp>
+        <p:nvSpPr>
+          <p:cNvPr id="13" name="Striped Right Arrow 12"/>
+          <p:cNvSpPr/>
+          <p:nvPr/>
+        </p:nvSpPr>
+        <p:spPr>
+          <a:xfrm>
+            <a:off x="4540222" y="3212976"/>
+            <a:ext cx="1831978" cy="432048"/>
+          </a:xfrm>
+          <a:prstGeom prst="stripedRightArrow">
+            <a:avLst/>
+          </a:prstGeom>
+        </p:spPr>
+        <p:style>
+          <a:lnRef idx="1">
+            <a:schemeClr val="dk1"/>
+          </a:lnRef>
+          <a:fillRef idx="2">
+            <a:schemeClr val="dk1"/>
+          </a:fillRef>
+          <a:effectRef idx="1">
+            <a:schemeClr val="dk1"/>
+          </a:effectRef>
+          <a:fontRef idx="minor">
+            <a:schemeClr val="dk1"/>
+          </a:fontRef>
+        </p:style>
+        <p:txBody>
+          <a:bodyPr rtlCol="0" anchor="ctr"/>
+          <a:lstStyle/>
+          <a:p>
+            <a:pPr algn="ctr"/>
+            <a:endParaRPr lang="en-GB"/>
+          </a:p>
+        </p:txBody>
+      </p:sp>
+      <p:sp>
+        <p:nvSpPr>
+          <p:cNvPr id="14" name="Striped Right Arrow 13"/>
+          <p:cNvSpPr/>
+          <p:nvPr/>
+        </p:nvSpPr>
+        <p:spPr>
+          <a:xfrm>
+            <a:off x="2806114" y="4077072"/>
+            <a:ext cx="3024336" cy="432048"/>
+          </a:xfrm>
+          <a:prstGeom prst="stripedRightArrow">
+            <a:avLst/>
+          </a:prstGeom>
+        </p:spPr>
+        <p:style>
+          <a:lnRef idx="1">
+            <a:schemeClr val="dk1"/>
+          </a:lnRef>
+          <a:fillRef idx="2">
+            <a:schemeClr val="dk1"/>
+          </a:fillRef>
+          <a:effectRef idx="1">
+            <a:schemeClr val="dk1"/>
+          </a:effectRef>
+          <a:fontRef idx="minor">
+            <a:schemeClr val="dk1"/>
+          </a:fontRef>
+        </p:style>
+        <p:txBody>
+          <a:bodyPr rtlCol="0" anchor="ctr"/>
+          <a:lstStyle/>
+          <a:p>
+            <a:pPr algn="ctr"/>
+            <a:endParaRPr lang="en-GB"/>
+          </a:p>
+        </p:txBody>
+      </p:sp>
+      <p:cxnSp>
+        <p:nvCxnSpPr>
+          <p:cNvPr id="17" name="Straight Arrow Connector 16"/>
+          <p:cNvCxnSpPr>
+            <a:stCxn id="11" idx="3"/>
+            <a:endCxn id="12" idx="1"/>
+          </p:cNvCxnSpPr>
+          <p:nvPr/>
+        </p:nvCxnSpPr>
+        <p:spPr>
+          <a:xfrm flipH="1">
+            <a:off x="2708244" y="2636912"/>
+            <a:ext cx="3123896" cy="792088"/>
+          </a:xfrm>
+          <a:prstGeom prst="straightConnector1">
+            <a:avLst/>
+          </a:prstGeom>
+          <a:ln w="57150">
+            <a:solidFill>
+              <a:srgbClr val="FF0000"/>
+            </a:solidFill>
+            <a:headEnd type="none" w="med" len="med"/>
+            <a:tailEnd type="triangle" w="med" len="med"/>
+          </a:ln>
+        </p:spPr>
+        <p:style>
+          <a:lnRef idx="1">
+            <a:schemeClr val="accent1"/>
+          </a:lnRef>
+          <a:fillRef idx="0">
+            <a:schemeClr val="accent1"/>
+          </a:fillRef>
+          <a:effectRef idx="0">
+            <a:schemeClr val="accent1"/>
+          </a:effectRef>
+          <a:fontRef idx="minor">
+            <a:schemeClr val="tx1"/>
+          </a:fontRef>
+        </p:style>
+      </p:cxnSp>
+      <p:cxnSp>
+        <p:nvCxnSpPr>
+          <p:cNvPr id="18" name="Straight Arrow Connector 17"/>
+          <p:cNvCxnSpPr>
+            <a:stCxn id="11" idx="3"/>
+            <a:endCxn id="13" idx="1"/>
+          </p:cNvCxnSpPr>
+          <p:nvPr/>
+        </p:nvCxnSpPr>
+        <p:spPr>
+          <a:xfrm flipH="1">
+            <a:off x="4540222" y="2636912"/>
+            <a:ext cx="1291918" cy="792088"/>
+          </a:xfrm>
+          <a:prstGeom prst="straightConnector1">
+            <a:avLst/>
+          </a:prstGeom>
+          <a:ln w="57150">
+            <a:solidFill>
+              <a:srgbClr val="FF0000"/>
+            </a:solidFill>
+            <a:headEnd type="none" w="med" len="med"/>
+            <a:tailEnd type="triangle" w="med" len="med"/>
+          </a:ln>
+        </p:spPr>
+        <p:style>
+          <a:lnRef idx="1">
+            <a:schemeClr val="accent1"/>
+          </a:lnRef>
+          <a:fillRef idx="0">
+            <a:schemeClr val="accent1"/>
+          </a:fillRef>
+          <a:effectRef idx="0">
+            <a:schemeClr val="accent1"/>
+          </a:effectRef>
+          <a:fontRef idx="minor">
+            <a:schemeClr val="tx1"/>
+          </a:fontRef>
+        </p:style>
+      </p:cxnSp>
+      <p:cxnSp>
+        <p:nvCxnSpPr>
+          <p:cNvPr id="22" name="Straight Arrow Connector 21"/>
+          <p:cNvCxnSpPr>
+            <a:stCxn id="14" idx="1"/>
+            <a:endCxn id="12" idx="1"/>
+          </p:cNvCxnSpPr>
+          <p:nvPr/>
+        </p:nvCxnSpPr>
+        <p:spPr>
+          <a:xfrm flipH="1" flipV="1">
+            <a:off x="2708244" y="3429000"/>
+            <a:ext cx="97870" cy="864096"/>
+          </a:xfrm>
+          <a:prstGeom prst="straightConnector1">
+            <a:avLst/>
+          </a:prstGeom>
+          <a:ln w="57150">
+            <a:solidFill>
+              <a:srgbClr val="FF0000"/>
+            </a:solidFill>
+            <a:headEnd type="none" w="med" len="med"/>
+            <a:tailEnd type="triangle" w="med" len="med"/>
+          </a:ln>
+        </p:spPr>
+        <p:style>
+          <a:lnRef idx="1">
+            <a:schemeClr val="accent1"/>
+          </a:lnRef>
+          <a:fillRef idx="0">
+            <a:schemeClr val="accent1"/>
+          </a:fillRef>
+          <a:effectRef idx="0">
+            <a:schemeClr val="accent1"/>
+          </a:effectRef>
+          <a:fontRef idx="minor">
+            <a:schemeClr val="tx1"/>
+          </a:fontRef>
+        </p:style>
+      </p:cxnSp>
+      <p:cxnSp>
+        <p:nvCxnSpPr>
+          <p:cNvPr id="25" name="Straight Arrow Connector 24"/>
+          <p:cNvCxnSpPr>
+            <a:stCxn id="14" idx="1"/>
+            <a:endCxn id="13" idx="1"/>
+          </p:cNvCxnSpPr>
+          <p:nvPr/>
+        </p:nvCxnSpPr>
+        <p:spPr>
+          <a:xfrm flipV="1">
+            <a:off x="2806114" y="3429000"/>
+            <a:ext cx="1734108" cy="864096"/>
+          </a:xfrm>
+          <a:prstGeom prst="straightConnector1">
+            <a:avLst/>
+          </a:prstGeom>
+          <a:ln w="57150">
+            <a:solidFill>
+              <a:srgbClr val="FF0000"/>
+            </a:solidFill>
+            <a:headEnd type="none" w="med" len="med"/>
+            <a:tailEnd type="triangle" w="med" len="med"/>
+          </a:ln>
+        </p:spPr>
+        <p:style>
+          <a:lnRef idx="1">
+            <a:schemeClr val="accent1"/>
+          </a:lnRef>
+          <a:fillRef idx="0">
+            <a:schemeClr val="accent1"/>
+          </a:fillRef>
+          <a:effectRef idx="0">
+            <a:schemeClr val="accent1"/>
+          </a:effectRef>
+          <a:fontRef idx="minor">
+            <a:schemeClr val="tx1"/>
+          </a:fontRef>
+        </p:style>
+      </p:cxnSp>
+      <p:sp>
+        <p:nvSpPr>
+          <p:cNvPr id="32" name="Striped Right Arrow 31"/>
+          <p:cNvSpPr/>
+          <p:nvPr/>
+        </p:nvSpPr>
+        <p:spPr>
+          <a:xfrm>
+            <a:off x="5832140" y="5714817"/>
+            <a:ext cx="3024336" cy="432048"/>
+          </a:xfrm>
+          <a:prstGeom prst="stripedRightArrow">
+            <a:avLst/>
+          </a:prstGeom>
+        </p:spPr>
+        <p:style>
+          <a:lnRef idx="1">
+            <a:schemeClr val="dk1"/>
+          </a:lnRef>
+          <a:fillRef idx="2">
+            <a:schemeClr val="dk1"/>
+          </a:fillRef>
+          <a:effectRef idx="1">
+            <a:schemeClr val="dk1"/>
+          </a:effectRef>
+          <a:fontRef idx="minor">
+            <a:schemeClr val="dk1"/>
+          </a:fontRef>
+        </p:style>
+        <p:txBody>
+          <a:bodyPr rtlCol="0" anchor="ctr"/>
+          <a:lstStyle/>
+          <a:p>
+            <a:pPr algn="ctr"/>
+            <a:endParaRPr lang="en-GB"/>
+          </a:p>
+        </p:txBody>
+      </p:sp>
+      <p:cxnSp>
+        <p:nvCxnSpPr>
+          <p:cNvPr id="33" name="Straight Arrow Connector 32"/>
+          <p:cNvCxnSpPr>
+            <a:stCxn id="13" idx="3"/>
+            <a:endCxn id="32" idx="1"/>
+          </p:cNvCxnSpPr>
+          <p:nvPr/>
+        </p:nvCxnSpPr>
+        <p:spPr>
+          <a:xfrm flipH="1">
+            <a:off x="5832140" y="3429000"/>
+            <a:ext cx="540060" cy="2501841"/>
+          </a:xfrm>
+          <a:prstGeom prst="straightConnector1">
+            <a:avLst/>
+          </a:prstGeom>
+          <a:ln w="57150">
+            <a:solidFill>
+              <a:srgbClr val="FF0000"/>
+            </a:solidFill>
+            <a:headEnd type="none" w="med" len="med"/>
+            <a:tailEnd type="triangle" w="med" len="med"/>
+          </a:ln>
+        </p:spPr>
+        <p:style>
+          <a:lnRef idx="1">
+            <a:schemeClr val="accent1"/>
+          </a:lnRef>
+          <a:fillRef idx="0">
+            <a:schemeClr val="accent1"/>
+          </a:fillRef>
+          <a:effectRef idx="0">
+            <a:schemeClr val="accent1"/>
+          </a:effectRef>
+          <a:fontRef idx="minor">
+            <a:schemeClr val="tx1"/>
+          </a:fontRef>
+        </p:style>
+      </p:cxnSp>
+      <p:sp>
+        <p:nvSpPr>
+          <p:cNvPr id="19" name="Title 1"/>
+          <p:cNvSpPr>
+            <a:spLocks noGrp="1"/>
+          </p:cNvSpPr>
+          <p:nvPr>
+            <p:ph type="title"/>
+          </p:nvPr>
+        </p:nvSpPr>
+        <p:spPr>
+          <a:xfrm>
+            <a:off x="457200" y="274638"/>
+            <a:ext cx="8229600" cy="1143000"/>
+          </a:xfrm>
+        </p:spPr>
+        <p:txBody>
+          <a:bodyPr/>
+          <a:lstStyle/>
+          <a:p>
+            <a:r>
+              <a:rPr lang="en-GB" dirty="0" smtClean="0"/>
+              <a:t>Bad</a:t>
+            </a:r>
+            <a:endParaRPr lang="en-GB" dirty="0"/>
+          </a:p>
+        </p:txBody>
+      </p:sp>
+    </p:spTree>
+    <p:extLst>
+      <p:ext uri="{BB962C8B-B14F-4D97-AF65-F5344CB8AC3E}">
+        <p14:creationId xmlns:p14="http://schemas.microsoft.com/office/powerpoint/2010/main" val="2291024588"/>
+      </p:ext>
+    </p:extLst>
+  </p:cSld>
+  <p:clrMapOvr>
+    <a:masterClrMapping/>
+  </p:clrMapOvr>
+  <p:timing>
+    <p:tnLst>
+      <p:par>
+        <p:cTn id="1" dur="indefinite" restart="never" nodeType="tmRoot"/>
+      </p:par>
+    </p:tnLst>
+  </p:timing>
+</p:sld>
+</file>
+
+<file path=ppt/slides/slide3.xml><?xml version="1.0" encoding="utf-8"?>
+<p:sld xmlns:a="http://schemas.openxmlformats.org/drawingml/2006/main" xmlns:r="http://schemas.openxmlformats.org/officeDocument/2006/relationships" xmlns:p="http://schemas.openxmlformats.org/presentationml/2006/main">
+  <p:cSld>
+    <p:spTree>
+      <p:nvGrpSpPr>
+        <p:cNvPr id="1" name=""/>
+        <p:cNvGrpSpPr/>
+        <p:nvPr/>
+      </p:nvGrpSpPr>
+      <p:grpSpPr>
+        <a:xfrm>
+          <a:off x="0" y="0"/>
+          <a:ext cx="0" cy="0"/>
+          <a:chOff x="0" y="0"/>
+          <a:chExt cx="0" cy="0"/>
+        </a:xfrm>
+      </p:grpSpPr>
+      <p:sp>
+        <p:nvSpPr>
+          <p:cNvPr id="4" name="TextBox 3"/>
+          <p:cNvSpPr txBox="1"/>
+          <p:nvPr/>
+        </p:nvSpPr>
+        <p:spPr>
+          <a:xfrm>
+            <a:off x="1907704" y="1819710"/>
+            <a:ext cx="1800200" cy="369332"/>
+          </a:xfrm>
+          <a:prstGeom prst="rect">
+            <a:avLst/>
+          </a:prstGeom>
+          <a:noFill/>
+        </p:spPr>
+        <p:txBody>
+          <a:bodyPr wrap="square" rtlCol="0">
+            <a:spAutoFit/>
+          </a:bodyPr>
+          <a:lstStyle/>
+          <a:p>
+            <a:r>
+              <a:rPr lang="en-GB" b="1" dirty="0" smtClean="0"/>
+              <a:t>Frame start time</a:t>
+            </a:r>
+            <a:endParaRPr lang="en-GB" b="1" dirty="0"/>
+          </a:p>
+        </p:txBody>
+      </p:sp>
+      <p:sp>
+        <p:nvSpPr>
+          <p:cNvPr id="5" name="TextBox 4"/>
+          <p:cNvSpPr txBox="1"/>
+          <p:nvPr/>
+        </p:nvSpPr>
+        <p:spPr>
+          <a:xfrm>
+            <a:off x="4932040" y="1819710"/>
+            <a:ext cx="1800200" cy="369332"/>
+          </a:xfrm>
+          <a:prstGeom prst="rect">
+            <a:avLst/>
+          </a:prstGeom>
+          <a:noFill/>
+        </p:spPr>
+        <p:txBody>
+          <a:bodyPr wrap="square" rtlCol="0">
+            <a:spAutoFit/>
+          </a:bodyPr>
+          <a:lstStyle/>
+          <a:p>
+            <a:r>
+              <a:rPr lang="en-GB" b="1" dirty="0" smtClean="0"/>
+              <a:t>Frame end time</a:t>
+            </a:r>
+            <a:endParaRPr lang="en-GB" b="1" dirty="0"/>
+          </a:p>
+        </p:txBody>
+      </p:sp>
+      <p:cxnSp>
+        <p:nvCxnSpPr>
+          <p:cNvPr id="7" name="Straight Connector 6"/>
+          <p:cNvCxnSpPr>
+            <a:stCxn id="4" idx="2"/>
+          </p:cNvCxnSpPr>
+          <p:nvPr/>
+        </p:nvCxnSpPr>
+        <p:spPr>
+          <a:xfrm>
+            <a:off x="2807804" y="2189042"/>
+            <a:ext cx="0" cy="3976262"/>
+          </a:xfrm>
+          <a:prstGeom prst="line">
+            <a:avLst/>
+          </a:prstGeom>
+          <a:ln w="28575"/>
+        </p:spPr>
+        <p:style>
+          <a:lnRef idx="1">
+            <a:schemeClr val="dk1"/>
+          </a:lnRef>
+          <a:fillRef idx="0">
+            <a:schemeClr val="dk1"/>
+          </a:fillRef>
+          <a:effectRef idx="0">
+            <a:schemeClr val="dk1"/>
+          </a:effectRef>
+          <a:fontRef idx="minor">
+            <a:schemeClr val="tx1"/>
+          </a:fontRef>
+        </p:style>
+      </p:cxnSp>
+      <p:cxnSp>
+        <p:nvCxnSpPr>
+          <p:cNvPr id="9" name="Straight Connector 8"/>
+          <p:cNvCxnSpPr>
+            <a:stCxn id="5" idx="2"/>
+          </p:cNvCxnSpPr>
+          <p:nvPr/>
+        </p:nvCxnSpPr>
+        <p:spPr>
+          <a:xfrm>
+            <a:off x="5832140" y="2189042"/>
+            <a:ext cx="0" cy="3976262"/>
+          </a:xfrm>
+          <a:prstGeom prst="line">
+            <a:avLst/>
+          </a:prstGeom>
+          <a:ln w="28575"/>
+        </p:spPr>
+        <p:style>
+          <a:lnRef idx="1">
+            <a:schemeClr val="dk1"/>
+          </a:lnRef>
+          <a:fillRef idx="0">
+            <a:schemeClr val="dk1"/>
+          </a:fillRef>
+          <a:effectRef idx="0">
+            <a:schemeClr val="dk1"/>
+          </a:effectRef>
+          <a:fontRef idx="minor">
+            <a:schemeClr val="tx1"/>
+          </a:fontRef>
+        </p:style>
+      </p:cxnSp>
+      <p:sp>
+        <p:nvSpPr>
+          <p:cNvPr id="10" name="TextBox 9"/>
+          <p:cNvSpPr txBox="1"/>
+          <p:nvPr/>
+        </p:nvSpPr>
+        <p:spPr>
+          <a:xfrm>
+            <a:off x="755576" y="2420888"/>
             <a:ext cx="1872208" cy="3693319"/>
           </a:xfrm>
           <a:prstGeom prst="rect">
@@ -4938,10 +5302,1380 @@
           </a:fontRef>
         </p:style>
       </p:cxnSp>
+      <p:sp>
+        <p:nvSpPr>
+          <p:cNvPr id="26" name="Title 1"/>
+          <p:cNvSpPr>
+            <a:spLocks noGrp="1"/>
+          </p:cNvSpPr>
+          <p:nvPr>
+            <p:ph type="title"/>
+          </p:nvPr>
+        </p:nvSpPr>
+        <p:spPr>
+          <a:xfrm>
+            <a:off x="457200" y="274638"/>
+            <a:ext cx="8229600" cy="1143000"/>
+          </a:xfrm>
+        </p:spPr>
+        <p:txBody>
+          <a:bodyPr/>
+          <a:lstStyle/>
+          <a:p>
+            <a:r>
+              <a:rPr lang="en-GB" dirty="0" smtClean="0"/>
+              <a:t>Good</a:t>
+            </a:r>
+            <a:endParaRPr lang="en-GB" dirty="0"/>
+          </a:p>
+        </p:txBody>
+      </p:sp>
     </p:spTree>
     <p:extLst>
       <p:ext uri="{BB962C8B-B14F-4D97-AF65-F5344CB8AC3E}">
         <p14:creationId xmlns:p14="http://schemas.microsoft.com/office/powerpoint/2010/main" val="352427627"/>
+      </p:ext>
+    </p:extLst>
+  </p:cSld>
+  <p:clrMapOvr>
+    <a:masterClrMapping/>
+  </p:clrMapOvr>
+  <p:timing>
+    <p:tnLst>
+      <p:par>
+        <p:cTn id="1" dur="indefinite" restart="never" nodeType="tmRoot"/>
+      </p:par>
+    </p:tnLst>
+  </p:timing>
+</p:sld>
+</file>
+
+<file path=ppt/slides/slide4.xml><?xml version="1.0" encoding="utf-8"?>
+<p:sld xmlns:a="http://schemas.openxmlformats.org/drawingml/2006/main" xmlns:r="http://schemas.openxmlformats.org/officeDocument/2006/relationships" xmlns:p="http://schemas.openxmlformats.org/presentationml/2006/main">
+  <p:cSld>
+    <p:spTree>
+      <p:nvGrpSpPr>
+        <p:cNvPr id="1" name=""/>
+        <p:cNvGrpSpPr/>
+        <p:nvPr/>
+      </p:nvGrpSpPr>
+      <p:grpSpPr>
+        <a:xfrm>
+          <a:off x="0" y="0"/>
+          <a:ext cx="0" cy="0"/>
+          <a:chOff x="0" y="0"/>
+          <a:chExt cx="0" cy="0"/>
+        </a:xfrm>
+      </p:grpSpPr>
+      <p:sp>
+        <p:nvSpPr>
+          <p:cNvPr id="4" name="Title 3"/>
+          <p:cNvSpPr>
+            <a:spLocks noGrp="1"/>
+          </p:cNvSpPr>
+          <p:nvPr>
+            <p:ph type="title"/>
+          </p:nvPr>
+        </p:nvSpPr>
+        <p:spPr/>
+        <p:txBody>
+          <a:bodyPr/>
+          <a:lstStyle/>
+          <a:p>
+            <a:r>
+              <a:rPr lang="en-GB" dirty="0" smtClean="0"/>
+              <a:t>System example</a:t>
+            </a:r>
+            <a:endParaRPr lang="en-GB" dirty="0"/>
+          </a:p>
+        </p:txBody>
+      </p:sp>
+      <p:sp>
+        <p:nvSpPr>
+          <p:cNvPr id="5" name="Text Placeholder 4"/>
+          <p:cNvSpPr>
+            <a:spLocks noGrp="1"/>
+          </p:cNvSpPr>
+          <p:nvPr>
+            <p:ph type="body" idx="1"/>
+          </p:nvPr>
+        </p:nvSpPr>
+        <p:spPr/>
+        <p:txBody>
+          <a:bodyPr/>
+          <a:lstStyle/>
+          <a:p>
+            <a:endParaRPr lang="en-GB"/>
+          </a:p>
+        </p:txBody>
+      </p:sp>
+    </p:spTree>
+    <p:extLst>
+      <p:ext uri="{BB962C8B-B14F-4D97-AF65-F5344CB8AC3E}">
+        <p14:creationId xmlns:p14="http://schemas.microsoft.com/office/powerpoint/2010/main" val="3853364302"/>
+      </p:ext>
+    </p:extLst>
+  </p:cSld>
+  <p:clrMapOvr>
+    <a:masterClrMapping/>
+  </p:clrMapOvr>
+  <p:timing>
+    <p:tnLst>
+      <p:par>
+        <p:cTn id="1" dur="indefinite" restart="never" nodeType="tmRoot"/>
+      </p:par>
+    </p:tnLst>
+  </p:timing>
+</p:sld>
+</file>
+
+<file path=ppt/slides/slide5.xml><?xml version="1.0" encoding="utf-8"?>
+<p:sld xmlns:a="http://schemas.openxmlformats.org/drawingml/2006/main" xmlns:r="http://schemas.openxmlformats.org/officeDocument/2006/relationships" xmlns:p="http://schemas.openxmlformats.org/presentationml/2006/main">
+  <p:cSld>
+    <p:spTree>
+      <p:nvGrpSpPr>
+        <p:cNvPr id="1" name=""/>
+        <p:cNvGrpSpPr/>
+        <p:nvPr/>
+      </p:nvGrpSpPr>
+      <p:grpSpPr>
+        <a:xfrm>
+          <a:off x="0" y="0"/>
+          <a:ext cx="0" cy="0"/>
+          <a:chOff x="0" y="0"/>
+          <a:chExt cx="0" cy="0"/>
+        </a:xfrm>
+      </p:grpSpPr>
+      <p:sp>
+        <p:nvSpPr>
+          <p:cNvPr id="4" name="TextBox 3"/>
+          <p:cNvSpPr txBox="1"/>
+          <p:nvPr/>
+        </p:nvSpPr>
+        <p:spPr>
+          <a:xfrm>
+            <a:off x="1907704" y="1819710"/>
+            <a:ext cx="1800200" cy="369332"/>
+          </a:xfrm>
+          <a:prstGeom prst="rect">
+            <a:avLst/>
+          </a:prstGeom>
+          <a:noFill/>
+        </p:spPr>
+        <p:txBody>
+          <a:bodyPr wrap="square" rtlCol="0">
+            <a:spAutoFit/>
+          </a:bodyPr>
+          <a:lstStyle/>
+          <a:p>
+            <a:r>
+              <a:rPr lang="en-GB" b="1" dirty="0" smtClean="0"/>
+              <a:t>Frame start time</a:t>
+            </a:r>
+            <a:endParaRPr lang="en-GB" b="1" dirty="0"/>
+          </a:p>
+        </p:txBody>
+      </p:sp>
+      <p:sp>
+        <p:nvSpPr>
+          <p:cNvPr id="5" name="TextBox 4"/>
+          <p:cNvSpPr txBox="1"/>
+          <p:nvPr/>
+        </p:nvSpPr>
+        <p:spPr>
+          <a:xfrm>
+            <a:off x="4932040" y="1819710"/>
+            <a:ext cx="1800200" cy="369332"/>
+          </a:xfrm>
+          <a:prstGeom prst="rect">
+            <a:avLst/>
+          </a:prstGeom>
+          <a:noFill/>
+        </p:spPr>
+        <p:txBody>
+          <a:bodyPr wrap="square" rtlCol="0">
+            <a:spAutoFit/>
+          </a:bodyPr>
+          <a:lstStyle/>
+          <a:p>
+            <a:r>
+              <a:rPr lang="en-GB" b="1" dirty="0" smtClean="0"/>
+              <a:t>Frame end time</a:t>
+            </a:r>
+            <a:endParaRPr lang="en-GB" b="1" dirty="0"/>
+          </a:p>
+        </p:txBody>
+      </p:sp>
+      <p:cxnSp>
+        <p:nvCxnSpPr>
+          <p:cNvPr id="7" name="Straight Connector 6"/>
+          <p:cNvCxnSpPr>
+            <a:stCxn id="4" idx="2"/>
+          </p:cNvCxnSpPr>
+          <p:nvPr/>
+        </p:nvCxnSpPr>
+        <p:spPr>
+          <a:xfrm flipH="1">
+            <a:off x="2806114" y="2189042"/>
+            <a:ext cx="1690" cy="1709174"/>
+          </a:xfrm>
+          <a:prstGeom prst="line">
+            <a:avLst/>
+          </a:prstGeom>
+          <a:ln w="28575"/>
+        </p:spPr>
+        <p:style>
+          <a:lnRef idx="1">
+            <a:schemeClr val="dk1"/>
+          </a:lnRef>
+          <a:fillRef idx="0">
+            <a:schemeClr val="dk1"/>
+          </a:fillRef>
+          <a:effectRef idx="0">
+            <a:schemeClr val="dk1"/>
+          </a:effectRef>
+          <a:fontRef idx="minor">
+            <a:schemeClr val="tx1"/>
+          </a:fontRef>
+        </p:style>
+      </p:cxnSp>
+      <p:cxnSp>
+        <p:nvCxnSpPr>
+          <p:cNvPr id="9" name="Straight Connector 8"/>
+          <p:cNvCxnSpPr>
+            <a:stCxn id="5" idx="2"/>
+          </p:cNvCxnSpPr>
+          <p:nvPr/>
+        </p:nvCxnSpPr>
+        <p:spPr>
+          <a:xfrm flipH="1">
+            <a:off x="5832139" y="2189042"/>
+            <a:ext cx="1" cy="1709174"/>
+          </a:xfrm>
+          <a:prstGeom prst="line">
+            <a:avLst/>
+          </a:prstGeom>
+          <a:ln w="28575"/>
+        </p:spPr>
+        <p:style>
+          <a:lnRef idx="1">
+            <a:schemeClr val="dk1"/>
+          </a:lnRef>
+          <a:fillRef idx="0">
+            <a:schemeClr val="dk1"/>
+          </a:fillRef>
+          <a:effectRef idx="0">
+            <a:schemeClr val="dk1"/>
+          </a:effectRef>
+          <a:fontRef idx="minor">
+            <a:schemeClr val="tx1"/>
+          </a:fontRef>
+        </p:style>
+      </p:cxnSp>
+      <p:sp>
+        <p:nvSpPr>
+          <p:cNvPr id="10" name="TextBox 9"/>
+          <p:cNvSpPr txBox="1"/>
+          <p:nvPr/>
+        </p:nvSpPr>
+        <p:spPr>
+          <a:xfrm>
+            <a:off x="1619672" y="2420888"/>
+            <a:ext cx="1080120" cy="1477328"/>
+          </a:xfrm>
+          <a:prstGeom prst="rect">
+            <a:avLst/>
+          </a:prstGeom>
+          <a:noFill/>
+        </p:spPr>
+        <p:txBody>
+          <a:bodyPr wrap="square" rtlCol="0">
+            <a:spAutoFit/>
+          </a:bodyPr>
+          <a:lstStyle/>
+          <a:p>
+            <a:r>
+              <a:rPr lang="en-GB" dirty="0" err="1" smtClean="0"/>
+              <a:t>Vel</a:t>
+            </a:r>
+            <a:endParaRPr lang="en-GB" dirty="0" smtClean="0"/>
+          </a:p>
+          <a:p>
+            <a:endParaRPr lang="en-GB" dirty="0" smtClean="0"/>
+          </a:p>
+          <a:p>
+            <a:endParaRPr lang="en-GB" dirty="0" smtClean="0"/>
+          </a:p>
+          <a:p>
+            <a:r>
+              <a:rPr lang="en-GB" dirty="0" err="1" smtClean="0"/>
+              <a:t>Pos</a:t>
+            </a:r>
+            <a:endParaRPr lang="en-GB" dirty="0" smtClean="0"/>
+          </a:p>
+          <a:p>
+            <a:endParaRPr lang="en-GB" dirty="0" smtClean="0"/>
+          </a:p>
+        </p:txBody>
+      </p:sp>
+      <p:sp>
+        <p:nvSpPr>
+          <p:cNvPr id="11" name="Striped Right Arrow 10"/>
+          <p:cNvSpPr/>
+          <p:nvPr/>
+        </p:nvSpPr>
+        <p:spPr>
+          <a:xfrm>
+            <a:off x="2807804" y="2420888"/>
+            <a:ext cx="3024336" cy="432048"/>
+          </a:xfrm>
+          <a:prstGeom prst="stripedRightArrow">
+            <a:avLst/>
+          </a:prstGeom>
+        </p:spPr>
+        <p:style>
+          <a:lnRef idx="1">
+            <a:schemeClr val="dk1"/>
+          </a:lnRef>
+          <a:fillRef idx="2">
+            <a:schemeClr val="dk1"/>
+          </a:fillRef>
+          <a:effectRef idx="1">
+            <a:schemeClr val="dk1"/>
+          </a:effectRef>
+          <a:fontRef idx="minor">
+            <a:schemeClr val="dk1"/>
+          </a:fontRef>
+        </p:style>
+        <p:txBody>
+          <a:bodyPr rtlCol="0" anchor="ctr"/>
+          <a:lstStyle/>
+          <a:p>
+            <a:pPr algn="ctr"/>
+            <a:endParaRPr lang="en-GB"/>
+          </a:p>
+        </p:txBody>
+      </p:sp>
+      <p:sp>
+        <p:nvSpPr>
+          <p:cNvPr id="12" name="Striped Right Arrow 11"/>
+          <p:cNvSpPr/>
+          <p:nvPr/>
+        </p:nvSpPr>
+        <p:spPr>
+          <a:xfrm>
+            <a:off x="2806114" y="3212976"/>
+            <a:ext cx="3026025" cy="432048"/>
+          </a:xfrm>
+          <a:prstGeom prst="stripedRightArrow">
+            <a:avLst/>
+          </a:prstGeom>
+        </p:spPr>
+        <p:style>
+          <a:lnRef idx="1">
+            <a:schemeClr val="dk1"/>
+          </a:lnRef>
+          <a:fillRef idx="2">
+            <a:schemeClr val="dk1"/>
+          </a:fillRef>
+          <a:effectRef idx="1">
+            <a:schemeClr val="dk1"/>
+          </a:effectRef>
+          <a:fontRef idx="minor">
+            <a:schemeClr val="dk1"/>
+          </a:fontRef>
+        </p:style>
+        <p:txBody>
+          <a:bodyPr rtlCol="0" anchor="ctr"/>
+          <a:lstStyle/>
+          <a:p>
+            <a:pPr algn="ctr"/>
+            <a:endParaRPr lang="en-GB"/>
+          </a:p>
+        </p:txBody>
+      </p:sp>
+      <p:cxnSp>
+        <p:nvCxnSpPr>
+          <p:cNvPr id="17" name="Straight Arrow Connector 16"/>
+          <p:cNvCxnSpPr>
+            <a:stCxn id="11" idx="3"/>
+            <a:endCxn id="12" idx="1"/>
+          </p:cNvCxnSpPr>
+          <p:nvPr/>
+        </p:nvCxnSpPr>
+        <p:spPr>
+          <a:xfrm flipH="1">
+            <a:off x="2806114" y="2636912"/>
+            <a:ext cx="3026026" cy="792088"/>
+          </a:xfrm>
+          <a:prstGeom prst="straightConnector1">
+            <a:avLst/>
+          </a:prstGeom>
+          <a:ln w="57150">
+            <a:solidFill>
+              <a:srgbClr val="FF0000"/>
+            </a:solidFill>
+            <a:headEnd type="none" w="med" len="med"/>
+            <a:tailEnd type="triangle" w="med" len="med"/>
+          </a:ln>
+        </p:spPr>
+        <p:style>
+          <a:lnRef idx="1">
+            <a:schemeClr val="accent1"/>
+          </a:lnRef>
+          <a:fillRef idx="0">
+            <a:schemeClr val="accent1"/>
+          </a:fillRef>
+          <a:effectRef idx="0">
+            <a:schemeClr val="accent1"/>
+          </a:effectRef>
+          <a:fontRef idx="minor">
+            <a:schemeClr val="tx1"/>
+          </a:fontRef>
+        </p:style>
+      </p:cxnSp>
+      <p:sp>
+        <p:nvSpPr>
+          <p:cNvPr id="19" name="Title 1"/>
+          <p:cNvSpPr>
+            <a:spLocks noGrp="1"/>
+          </p:cNvSpPr>
+          <p:nvPr>
+            <p:ph type="title"/>
+          </p:nvPr>
+        </p:nvSpPr>
+        <p:spPr>
+          <a:xfrm>
+            <a:off x="457200" y="274638"/>
+            <a:ext cx="8229600" cy="1143000"/>
+          </a:xfrm>
+        </p:spPr>
+        <p:txBody>
+          <a:bodyPr/>
+          <a:lstStyle/>
+          <a:p>
+            <a:r>
+              <a:rPr lang="en-GB" dirty="0" err="1" smtClean="0"/>
+              <a:t>Pos</a:t>
+            </a:r>
+            <a:r>
+              <a:rPr lang="en-GB" dirty="0" smtClean="0"/>
+              <a:t>/</a:t>
+            </a:r>
+            <a:r>
+              <a:rPr lang="en-GB" dirty="0" err="1"/>
+              <a:t>V</a:t>
+            </a:r>
+            <a:r>
+              <a:rPr lang="en-GB" dirty="0" err="1" smtClean="0"/>
+              <a:t>el</a:t>
+            </a:r>
+            <a:r>
+              <a:rPr lang="en-GB" dirty="0" smtClean="0"/>
+              <a:t> Example – Bad 1</a:t>
+            </a:r>
+            <a:endParaRPr lang="en-GB" dirty="0"/>
+          </a:p>
+        </p:txBody>
+      </p:sp>
+      <p:cxnSp>
+        <p:nvCxnSpPr>
+          <p:cNvPr id="26" name="Straight Arrow Connector 25"/>
+          <p:cNvCxnSpPr>
+            <a:stCxn id="12" idx="1"/>
+            <a:endCxn id="11" idx="1"/>
+          </p:cNvCxnSpPr>
+          <p:nvPr/>
+        </p:nvCxnSpPr>
+        <p:spPr>
+          <a:xfrm flipV="1">
+            <a:off x="2806114" y="2636912"/>
+            <a:ext cx="1690" cy="792088"/>
+          </a:xfrm>
+          <a:prstGeom prst="straightConnector1">
+            <a:avLst/>
+          </a:prstGeom>
+          <a:ln w="57150">
+            <a:solidFill>
+              <a:srgbClr val="FF0000"/>
+            </a:solidFill>
+            <a:headEnd type="none" w="med" len="med"/>
+            <a:tailEnd type="triangle" w="med" len="med"/>
+          </a:ln>
+        </p:spPr>
+        <p:style>
+          <a:lnRef idx="1">
+            <a:schemeClr val="accent1"/>
+          </a:lnRef>
+          <a:fillRef idx="0">
+            <a:schemeClr val="accent1"/>
+          </a:fillRef>
+          <a:effectRef idx="0">
+            <a:schemeClr val="accent1"/>
+          </a:effectRef>
+          <a:fontRef idx="minor">
+            <a:schemeClr val="tx1"/>
+          </a:fontRef>
+        </p:style>
+      </p:cxnSp>
+      <p:sp>
+        <p:nvSpPr>
+          <p:cNvPr id="27" name="TextBox 26"/>
+          <p:cNvSpPr txBox="1"/>
+          <p:nvPr/>
+        </p:nvSpPr>
+        <p:spPr>
+          <a:xfrm>
+            <a:off x="5076056" y="2708920"/>
+            <a:ext cx="360040" cy="646331"/>
+          </a:xfrm>
+          <a:prstGeom prst="rect">
+            <a:avLst/>
+          </a:prstGeom>
+          <a:noFill/>
+        </p:spPr>
+        <p:txBody>
+          <a:bodyPr wrap="square" rtlCol="0">
+            <a:spAutoFit/>
+          </a:bodyPr>
+          <a:lstStyle/>
+          <a:p>
+            <a:r>
+              <a:rPr lang="en-GB" sz="3600" dirty="0" smtClean="0">
+                <a:solidFill>
+                  <a:srgbClr val="FF0000"/>
+                </a:solidFill>
+              </a:rPr>
+              <a:t>!</a:t>
+            </a:r>
+            <a:endParaRPr lang="en-GB" sz="3600" dirty="0">
+              <a:solidFill>
+                <a:srgbClr val="FF0000"/>
+              </a:solidFill>
+            </a:endParaRPr>
+          </a:p>
+        </p:txBody>
+      </p:sp>
+    </p:spTree>
+    <p:extLst>
+      <p:ext uri="{BB962C8B-B14F-4D97-AF65-F5344CB8AC3E}">
+        <p14:creationId xmlns:p14="http://schemas.microsoft.com/office/powerpoint/2010/main" val="2292867159"/>
+      </p:ext>
+    </p:extLst>
+  </p:cSld>
+  <p:clrMapOvr>
+    <a:masterClrMapping/>
+  </p:clrMapOvr>
+  <p:timing>
+    <p:tnLst>
+      <p:par>
+        <p:cTn id="1" dur="indefinite" restart="never" nodeType="tmRoot"/>
+      </p:par>
+    </p:tnLst>
+  </p:timing>
+</p:sld>
+</file>
+
+<file path=ppt/slides/slide6.xml><?xml version="1.0" encoding="utf-8"?>
+<p:sld xmlns:a="http://schemas.openxmlformats.org/drawingml/2006/main" xmlns:r="http://schemas.openxmlformats.org/officeDocument/2006/relationships" xmlns:p="http://schemas.openxmlformats.org/presentationml/2006/main">
+  <p:cSld>
+    <p:spTree>
+      <p:nvGrpSpPr>
+        <p:cNvPr id="1" name=""/>
+        <p:cNvGrpSpPr/>
+        <p:nvPr/>
+      </p:nvGrpSpPr>
+      <p:grpSpPr>
+        <a:xfrm>
+          <a:off x="0" y="0"/>
+          <a:ext cx="0" cy="0"/>
+          <a:chOff x="0" y="0"/>
+          <a:chExt cx="0" cy="0"/>
+        </a:xfrm>
+      </p:grpSpPr>
+      <p:sp>
+        <p:nvSpPr>
+          <p:cNvPr id="4" name="TextBox 3"/>
+          <p:cNvSpPr txBox="1"/>
+          <p:nvPr/>
+        </p:nvSpPr>
+        <p:spPr>
+          <a:xfrm>
+            <a:off x="1907704" y="1819710"/>
+            <a:ext cx="1800200" cy="369332"/>
+          </a:xfrm>
+          <a:prstGeom prst="rect">
+            <a:avLst/>
+          </a:prstGeom>
+          <a:noFill/>
+        </p:spPr>
+        <p:txBody>
+          <a:bodyPr wrap="square" rtlCol="0">
+            <a:spAutoFit/>
+          </a:bodyPr>
+          <a:lstStyle/>
+          <a:p>
+            <a:r>
+              <a:rPr lang="en-GB" b="1" dirty="0" smtClean="0"/>
+              <a:t>Frame start time</a:t>
+            </a:r>
+            <a:endParaRPr lang="en-GB" b="1" dirty="0"/>
+          </a:p>
+        </p:txBody>
+      </p:sp>
+      <p:sp>
+        <p:nvSpPr>
+          <p:cNvPr id="5" name="TextBox 4"/>
+          <p:cNvSpPr txBox="1"/>
+          <p:nvPr/>
+        </p:nvSpPr>
+        <p:spPr>
+          <a:xfrm>
+            <a:off x="4932040" y="1819710"/>
+            <a:ext cx="1800200" cy="369332"/>
+          </a:xfrm>
+          <a:prstGeom prst="rect">
+            <a:avLst/>
+          </a:prstGeom>
+          <a:noFill/>
+        </p:spPr>
+        <p:txBody>
+          <a:bodyPr wrap="square" rtlCol="0">
+            <a:spAutoFit/>
+          </a:bodyPr>
+          <a:lstStyle/>
+          <a:p>
+            <a:r>
+              <a:rPr lang="en-GB" b="1" dirty="0" smtClean="0"/>
+              <a:t>Frame end time</a:t>
+            </a:r>
+            <a:endParaRPr lang="en-GB" b="1" dirty="0"/>
+          </a:p>
+        </p:txBody>
+      </p:sp>
+      <p:cxnSp>
+        <p:nvCxnSpPr>
+          <p:cNvPr id="7" name="Straight Connector 6"/>
+          <p:cNvCxnSpPr>
+            <a:stCxn id="4" idx="2"/>
+          </p:cNvCxnSpPr>
+          <p:nvPr/>
+        </p:nvCxnSpPr>
+        <p:spPr>
+          <a:xfrm flipH="1">
+            <a:off x="2806114" y="2189042"/>
+            <a:ext cx="1690" cy="1709174"/>
+          </a:xfrm>
+          <a:prstGeom prst="line">
+            <a:avLst/>
+          </a:prstGeom>
+          <a:ln w="28575"/>
+        </p:spPr>
+        <p:style>
+          <a:lnRef idx="1">
+            <a:schemeClr val="dk1"/>
+          </a:lnRef>
+          <a:fillRef idx="0">
+            <a:schemeClr val="dk1"/>
+          </a:fillRef>
+          <a:effectRef idx="0">
+            <a:schemeClr val="dk1"/>
+          </a:effectRef>
+          <a:fontRef idx="minor">
+            <a:schemeClr val="tx1"/>
+          </a:fontRef>
+        </p:style>
+      </p:cxnSp>
+      <p:cxnSp>
+        <p:nvCxnSpPr>
+          <p:cNvPr id="9" name="Straight Connector 8"/>
+          <p:cNvCxnSpPr>
+            <a:stCxn id="5" idx="2"/>
+          </p:cNvCxnSpPr>
+          <p:nvPr/>
+        </p:nvCxnSpPr>
+        <p:spPr>
+          <a:xfrm flipH="1">
+            <a:off x="5832139" y="2189042"/>
+            <a:ext cx="1" cy="1709174"/>
+          </a:xfrm>
+          <a:prstGeom prst="line">
+            <a:avLst/>
+          </a:prstGeom>
+          <a:ln w="28575"/>
+        </p:spPr>
+        <p:style>
+          <a:lnRef idx="1">
+            <a:schemeClr val="dk1"/>
+          </a:lnRef>
+          <a:fillRef idx="0">
+            <a:schemeClr val="dk1"/>
+          </a:fillRef>
+          <a:effectRef idx="0">
+            <a:schemeClr val="dk1"/>
+          </a:effectRef>
+          <a:fontRef idx="minor">
+            <a:schemeClr val="tx1"/>
+          </a:fontRef>
+        </p:style>
+      </p:cxnSp>
+      <p:sp>
+        <p:nvSpPr>
+          <p:cNvPr id="10" name="TextBox 9"/>
+          <p:cNvSpPr txBox="1"/>
+          <p:nvPr/>
+        </p:nvSpPr>
+        <p:spPr>
+          <a:xfrm>
+            <a:off x="1619672" y="2420888"/>
+            <a:ext cx="1080120" cy="1477328"/>
+          </a:xfrm>
+          <a:prstGeom prst="rect">
+            <a:avLst/>
+          </a:prstGeom>
+          <a:noFill/>
+        </p:spPr>
+        <p:txBody>
+          <a:bodyPr wrap="square" rtlCol="0">
+            <a:spAutoFit/>
+          </a:bodyPr>
+          <a:lstStyle/>
+          <a:p>
+            <a:r>
+              <a:rPr lang="en-GB" dirty="0" err="1" smtClean="0"/>
+              <a:t>Pos</a:t>
+            </a:r>
+            <a:endParaRPr lang="en-GB" dirty="0" smtClean="0"/>
+          </a:p>
+          <a:p>
+            <a:endParaRPr lang="en-GB" dirty="0" smtClean="0"/>
+          </a:p>
+          <a:p>
+            <a:endParaRPr lang="en-GB" dirty="0" smtClean="0"/>
+          </a:p>
+          <a:p>
+            <a:r>
+              <a:rPr lang="en-GB" dirty="0" err="1" smtClean="0"/>
+              <a:t>Vel</a:t>
+            </a:r>
+            <a:endParaRPr lang="en-GB" dirty="0" smtClean="0"/>
+          </a:p>
+          <a:p>
+            <a:endParaRPr lang="en-GB" dirty="0" smtClean="0"/>
+          </a:p>
+        </p:txBody>
+      </p:sp>
+      <p:sp>
+        <p:nvSpPr>
+          <p:cNvPr id="11" name="Striped Right Arrow 10"/>
+          <p:cNvSpPr/>
+          <p:nvPr/>
+        </p:nvSpPr>
+        <p:spPr>
+          <a:xfrm>
+            <a:off x="2807804" y="2420888"/>
+            <a:ext cx="3024336" cy="432048"/>
+          </a:xfrm>
+          <a:prstGeom prst="stripedRightArrow">
+            <a:avLst/>
+          </a:prstGeom>
+        </p:spPr>
+        <p:style>
+          <a:lnRef idx="1">
+            <a:schemeClr val="dk1"/>
+          </a:lnRef>
+          <a:fillRef idx="2">
+            <a:schemeClr val="dk1"/>
+          </a:fillRef>
+          <a:effectRef idx="1">
+            <a:schemeClr val="dk1"/>
+          </a:effectRef>
+          <a:fontRef idx="minor">
+            <a:schemeClr val="dk1"/>
+          </a:fontRef>
+        </p:style>
+        <p:txBody>
+          <a:bodyPr rtlCol="0" anchor="ctr"/>
+          <a:lstStyle/>
+          <a:p>
+            <a:pPr algn="ctr"/>
+            <a:endParaRPr lang="en-GB"/>
+          </a:p>
+        </p:txBody>
+      </p:sp>
+      <p:sp>
+        <p:nvSpPr>
+          <p:cNvPr id="12" name="Striped Right Arrow 11"/>
+          <p:cNvSpPr/>
+          <p:nvPr/>
+        </p:nvSpPr>
+        <p:spPr>
+          <a:xfrm>
+            <a:off x="2806114" y="3212976"/>
+            <a:ext cx="3026025" cy="432048"/>
+          </a:xfrm>
+          <a:prstGeom prst="stripedRightArrow">
+            <a:avLst/>
+          </a:prstGeom>
+        </p:spPr>
+        <p:style>
+          <a:lnRef idx="1">
+            <a:schemeClr val="dk1"/>
+          </a:lnRef>
+          <a:fillRef idx="2">
+            <a:schemeClr val="dk1"/>
+          </a:fillRef>
+          <a:effectRef idx="1">
+            <a:schemeClr val="dk1"/>
+          </a:effectRef>
+          <a:fontRef idx="minor">
+            <a:schemeClr val="dk1"/>
+          </a:fontRef>
+        </p:style>
+        <p:txBody>
+          <a:bodyPr rtlCol="0" anchor="ctr"/>
+          <a:lstStyle/>
+          <a:p>
+            <a:pPr algn="ctr"/>
+            <a:endParaRPr lang="en-GB"/>
+          </a:p>
+        </p:txBody>
+      </p:sp>
+      <p:cxnSp>
+        <p:nvCxnSpPr>
+          <p:cNvPr id="17" name="Straight Arrow Connector 16"/>
+          <p:cNvCxnSpPr>
+            <a:stCxn id="11" idx="3"/>
+            <a:endCxn id="12" idx="1"/>
+          </p:cNvCxnSpPr>
+          <p:nvPr/>
+        </p:nvCxnSpPr>
+        <p:spPr>
+          <a:xfrm flipH="1">
+            <a:off x="2806114" y="2636912"/>
+            <a:ext cx="3026026" cy="792088"/>
+          </a:xfrm>
+          <a:prstGeom prst="straightConnector1">
+            <a:avLst/>
+          </a:prstGeom>
+          <a:ln w="57150">
+            <a:solidFill>
+              <a:srgbClr val="FF0000"/>
+            </a:solidFill>
+            <a:headEnd type="none" w="med" len="med"/>
+            <a:tailEnd type="triangle" w="med" len="med"/>
+          </a:ln>
+        </p:spPr>
+        <p:style>
+          <a:lnRef idx="1">
+            <a:schemeClr val="accent1"/>
+          </a:lnRef>
+          <a:fillRef idx="0">
+            <a:schemeClr val="accent1"/>
+          </a:fillRef>
+          <a:effectRef idx="0">
+            <a:schemeClr val="accent1"/>
+          </a:effectRef>
+          <a:fontRef idx="minor">
+            <a:schemeClr val="tx1"/>
+          </a:fontRef>
+        </p:style>
+      </p:cxnSp>
+      <p:sp>
+        <p:nvSpPr>
+          <p:cNvPr id="19" name="Title 1"/>
+          <p:cNvSpPr>
+            <a:spLocks noGrp="1"/>
+          </p:cNvSpPr>
+          <p:nvPr>
+            <p:ph type="title"/>
+          </p:nvPr>
+        </p:nvSpPr>
+        <p:spPr>
+          <a:xfrm>
+            <a:off x="457200" y="274638"/>
+            <a:ext cx="8229600" cy="1143000"/>
+          </a:xfrm>
+        </p:spPr>
+        <p:txBody>
+          <a:bodyPr/>
+          <a:lstStyle/>
+          <a:p>
+            <a:r>
+              <a:rPr lang="en-GB" dirty="0" err="1" smtClean="0"/>
+              <a:t>Pos</a:t>
+            </a:r>
+            <a:r>
+              <a:rPr lang="en-GB" dirty="0" smtClean="0"/>
+              <a:t>/</a:t>
+            </a:r>
+            <a:r>
+              <a:rPr lang="en-GB" dirty="0" err="1"/>
+              <a:t>V</a:t>
+            </a:r>
+            <a:r>
+              <a:rPr lang="en-GB" dirty="0" err="1" smtClean="0"/>
+              <a:t>el</a:t>
+            </a:r>
+            <a:r>
+              <a:rPr lang="en-GB" dirty="0" smtClean="0"/>
+              <a:t> Example – Bad 2</a:t>
+            </a:r>
+            <a:endParaRPr lang="en-GB" dirty="0"/>
+          </a:p>
+        </p:txBody>
+      </p:sp>
+      <p:cxnSp>
+        <p:nvCxnSpPr>
+          <p:cNvPr id="26" name="Straight Arrow Connector 25"/>
+          <p:cNvCxnSpPr>
+            <a:stCxn id="12" idx="1"/>
+            <a:endCxn id="11" idx="1"/>
+          </p:cNvCxnSpPr>
+          <p:nvPr/>
+        </p:nvCxnSpPr>
+        <p:spPr>
+          <a:xfrm flipV="1">
+            <a:off x="2806114" y="2636912"/>
+            <a:ext cx="1690" cy="792088"/>
+          </a:xfrm>
+          <a:prstGeom prst="straightConnector1">
+            <a:avLst/>
+          </a:prstGeom>
+          <a:ln w="57150">
+            <a:solidFill>
+              <a:srgbClr val="FF0000"/>
+            </a:solidFill>
+            <a:headEnd type="none" w="med" len="med"/>
+            <a:tailEnd type="triangle" w="med" len="med"/>
+          </a:ln>
+        </p:spPr>
+        <p:style>
+          <a:lnRef idx="1">
+            <a:schemeClr val="accent1"/>
+          </a:lnRef>
+          <a:fillRef idx="0">
+            <a:schemeClr val="accent1"/>
+          </a:fillRef>
+          <a:effectRef idx="0">
+            <a:schemeClr val="accent1"/>
+          </a:effectRef>
+          <a:fontRef idx="minor">
+            <a:schemeClr val="tx1"/>
+          </a:fontRef>
+        </p:style>
+      </p:cxnSp>
+      <p:sp>
+        <p:nvSpPr>
+          <p:cNvPr id="13" name="TextBox 12"/>
+          <p:cNvSpPr txBox="1"/>
+          <p:nvPr/>
+        </p:nvSpPr>
+        <p:spPr>
+          <a:xfrm>
+            <a:off x="5076056" y="2708920"/>
+            <a:ext cx="360040" cy="646331"/>
+          </a:xfrm>
+          <a:prstGeom prst="rect">
+            <a:avLst/>
+          </a:prstGeom>
+          <a:noFill/>
+        </p:spPr>
+        <p:txBody>
+          <a:bodyPr wrap="square" rtlCol="0">
+            <a:spAutoFit/>
+          </a:bodyPr>
+          <a:lstStyle/>
+          <a:p>
+            <a:r>
+              <a:rPr lang="en-GB" sz="3600" dirty="0" smtClean="0">
+                <a:solidFill>
+                  <a:srgbClr val="FF0000"/>
+                </a:solidFill>
+              </a:rPr>
+              <a:t>!</a:t>
+            </a:r>
+            <a:endParaRPr lang="en-GB" sz="3600" dirty="0">
+              <a:solidFill>
+                <a:srgbClr val="FF0000"/>
+              </a:solidFill>
+            </a:endParaRPr>
+          </a:p>
+        </p:txBody>
+      </p:sp>
+    </p:spTree>
+    <p:extLst>
+      <p:ext uri="{BB962C8B-B14F-4D97-AF65-F5344CB8AC3E}">
+        <p14:creationId xmlns:p14="http://schemas.microsoft.com/office/powerpoint/2010/main" val="1852898985"/>
+      </p:ext>
+    </p:extLst>
+  </p:cSld>
+  <p:clrMapOvr>
+    <a:masterClrMapping/>
+  </p:clrMapOvr>
+  <p:timing>
+    <p:tnLst>
+      <p:par>
+        <p:cTn id="1" dur="indefinite" restart="never" nodeType="tmRoot"/>
+      </p:par>
+    </p:tnLst>
+  </p:timing>
+</p:sld>
+</file>
+
+<file path=ppt/slides/slide7.xml><?xml version="1.0" encoding="utf-8"?>
+<p:sld xmlns:a="http://schemas.openxmlformats.org/drawingml/2006/main" xmlns:r="http://schemas.openxmlformats.org/officeDocument/2006/relationships" xmlns:p="http://schemas.openxmlformats.org/presentationml/2006/main">
+  <p:cSld>
+    <p:spTree>
+      <p:nvGrpSpPr>
+        <p:cNvPr id="1" name=""/>
+        <p:cNvGrpSpPr/>
+        <p:nvPr/>
+      </p:nvGrpSpPr>
+      <p:grpSpPr>
+        <a:xfrm>
+          <a:off x="0" y="0"/>
+          <a:ext cx="0" cy="0"/>
+          <a:chOff x="0" y="0"/>
+          <a:chExt cx="0" cy="0"/>
+        </a:xfrm>
+      </p:grpSpPr>
+      <p:sp>
+        <p:nvSpPr>
+          <p:cNvPr id="4" name="TextBox 3"/>
+          <p:cNvSpPr txBox="1"/>
+          <p:nvPr/>
+        </p:nvSpPr>
+        <p:spPr>
+          <a:xfrm>
+            <a:off x="1907704" y="1819710"/>
+            <a:ext cx="1800200" cy="369332"/>
+          </a:xfrm>
+          <a:prstGeom prst="rect">
+            <a:avLst/>
+          </a:prstGeom>
+          <a:noFill/>
+        </p:spPr>
+        <p:txBody>
+          <a:bodyPr wrap="square" rtlCol="0">
+            <a:spAutoFit/>
+          </a:bodyPr>
+          <a:lstStyle/>
+          <a:p>
+            <a:r>
+              <a:rPr lang="en-GB" b="1" dirty="0" smtClean="0"/>
+              <a:t>Frame start time</a:t>
+            </a:r>
+            <a:endParaRPr lang="en-GB" b="1" dirty="0"/>
+          </a:p>
+        </p:txBody>
+      </p:sp>
+      <p:sp>
+        <p:nvSpPr>
+          <p:cNvPr id="5" name="TextBox 4"/>
+          <p:cNvSpPr txBox="1"/>
+          <p:nvPr/>
+        </p:nvSpPr>
+        <p:spPr>
+          <a:xfrm>
+            <a:off x="4932040" y="1819710"/>
+            <a:ext cx="1800200" cy="369332"/>
+          </a:xfrm>
+          <a:prstGeom prst="rect">
+            <a:avLst/>
+          </a:prstGeom>
+          <a:noFill/>
+        </p:spPr>
+        <p:txBody>
+          <a:bodyPr wrap="square" rtlCol="0">
+            <a:spAutoFit/>
+          </a:bodyPr>
+          <a:lstStyle/>
+          <a:p>
+            <a:r>
+              <a:rPr lang="en-GB" b="1" dirty="0" smtClean="0"/>
+              <a:t>Frame end time</a:t>
+            </a:r>
+            <a:endParaRPr lang="en-GB" b="1" dirty="0"/>
+          </a:p>
+        </p:txBody>
+      </p:sp>
+      <p:cxnSp>
+        <p:nvCxnSpPr>
+          <p:cNvPr id="7" name="Straight Connector 6"/>
+          <p:cNvCxnSpPr>
+            <a:stCxn id="4" idx="2"/>
+          </p:cNvCxnSpPr>
+          <p:nvPr/>
+        </p:nvCxnSpPr>
+        <p:spPr>
+          <a:xfrm flipH="1">
+            <a:off x="2806114" y="2189042"/>
+            <a:ext cx="1690" cy="1709174"/>
+          </a:xfrm>
+          <a:prstGeom prst="line">
+            <a:avLst/>
+          </a:prstGeom>
+          <a:ln w="28575"/>
+        </p:spPr>
+        <p:style>
+          <a:lnRef idx="1">
+            <a:schemeClr val="dk1"/>
+          </a:lnRef>
+          <a:fillRef idx="0">
+            <a:schemeClr val="dk1"/>
+          </a:fillRef>
+          <a:effectRef idx="0">
+            <a:schemeClr val="dk1"/>
+          </a:effectRef>
+          <a:fontRef idx="minor">
+            <a:schemeClr val="tx1"/>
+          </a:fontRef>
+        </p:style>
+      </p:cxnSp>
+      <p:cxnSp>
+        <p:nvCxnSpPr>
+          <p:cNvPr id="9" name="Straight Connector 8"/>
+          <p:cNvCxnSpPr>
+            <a:stCxn id="5" idx="2"/>
+          </p:cNvCxnSpPr>
+          <p:nvPr/>
+        </p:nvCxnSpPr>
+        <p:spPr>
+          <a:xfrm flipH="1">
+            <a:off x="5832139" y="2189042"/>
+            <a:ext cx="1" cy="1709174"/>
+          </a:xfrm>
+          <a:prstGeom prst="line">
+            <a:avLst/>
+          </a:prstGeom>
+          <a:ln w="28575"/>
+        </p:spPr>
+        <p:style>
+          <a:lnRef idx="1">
+            <a:schemeClr val="dk1"/>
+          </a:lnRef>
+          <a:fillRef idx="0">
+            <a:schemeClr val="dk1"/>
+          </a:fillRef>
+          <a:effectRef idx="0">
+            <a:schemeClr val="dk1"/>
+          </a:effectRef>
+          <a:fontRef idx="minor">
+            <a:schemeClr val="tx1"/>
+          </a:fontRef>
+        </p:style>
+      </p:cxnSp>
+      <p:sp>
+        <p:nvSpPr>
+          <p:cNvPr id="10" name="TextBox 9"/>
+          <p:cNvSpPr txBox="1"/>
+          <p:nvPr/>
+        </p:nvSpPr>
+        <p:spPr>
+          <a:xfrm>
+            <a:off x="1619672" y="2420888"/>
+            <a:ext cx="1080120" cy="1477328"/>
+          </a:xfrm>
+          <a:prstGeom prst="rect">
+            <a:avLst/>
+          </a:prstGeom>
+          <a:noFill/>
+        </p:spPr>
+        <p:txBody>
+          <a:bodyPr wrap="square" rtlCol="0">
+            <a:spAutoFit/>
+          </a:bodyPr>
+          <a:lstStyle/>
+          <a:p>
+            <a:r>
+              <a:rPr lang="en-GB" dirty="0" err="1" smtClean="0"/>
+              <a:t>Pos</a:t>
+            </a:r>
+            <a:endParaRPr lang="en-GB" dirty="0" smtClean="0"/>
+          </a:p>
+          <a:p>
+            <a:endParaRPr lang="en-GB" dirty="0" smtClean="0"/>
+          </a:p>
+          <a:p>
+            <a:endParaRPr lang="en-GB" dirty="0" smtClean="0"/>
+          </a:p>
+          <a:p>
+            <a:r>
+              <a:rPr lang="en-GB" dirty="0" err="1" smtClean="0"/>
+              <a:t>Vel</a:t>
+            </a:r>
+            <a:endParaRPr lang="en-GB" dirty="0" smtClean="0"/>
+          </a:p>
+          <a:p>
+            <a:endParaRPr lang="en-GB" dirty="0" smtClean="0"/>
+          </a:p>
+        </p:txBody>
+      </p:sp>
+      <p:sp>
+        <p:nvSpPr>
+          <p:cNvPr id="11" name="Striped Right Arrow 10"/>
+          <p:cNvSpPr/>
+          <p:nvPr/>
+        </p:nvSpPr>
+        <p:spPr>
+          <a:xfrm>
+            <a:off x="2807804" y="2420888"/>
+            <a:ext cx="3024336" cy="432048"/>
+          </a:xfrm>
+          <a:prstGeom prst="stripedRightArrow">
+            <a:avLst/>
+          </a:prstGeom>
+        </p:spPr>
+        <p:style>
+          <a:lnRef idx="1">
+            <a:schemeClr val="dk1"/>
+          </a:lnRef>
+          <a:fillRef idx="2">
+            <a:schemeClr val="dk1"/>
+          </a:fillRef>
+          <a:effectRef idx="1">
+            <a:schemeClr val="dk1"/>
+          </a:effectRef>
+          <a:fontRef idx="minor">
+            <a:schemeClr val="dk1"/>
+          </a:fontRef>
+        </p:style>
+        <p:txBody>
+          <a:bodyPr rtlCol="0" anchor="ctr"/>
+          <a:lstStyle/>
+          <a:p>
+            <a:pPr algn="ctr"/>
+            <a:endParaRPr lang="en-GB"/>
+          </a:p>
+        </p:txBody>
+      </p:sp>
+      <p:sp>
+        <p:nvSpPr>
+          <p:cNvPr id="12" name="Striped Right Arrow 11"/>
+          <p:cNvSpPr/>
+          <p:nvPr/>
+        </p:nvSpPr>
+        <p:spPr>
+          <a:xfrm>
+            <a:off x="2806114" y="3212976"/>
+            <a:ext cx="3026025" cy="432048"/>
+          </a:xfrm>
+          <a:prstGeom prst="stripedRightArrow">
+            <a:avLst/>
+          </a:prstGeom>
+        </p:spPr>
+        <p:style>
+          <a:lnRef idx="1">
+            <a:schemeClr val="dk1"/>
+          </a:lnRef>
+          <a:fillRef idx="2">
+            <a:schemeClr val="dk1"/>
+          </a:fillRef>
+          <a:effectRef idx="1">
+            <a:schemeClr val="dk1"/>
+          </a:effectRef>
+          <a:fontRef idx="minor">
+            <a:schemeClr val="dk1"/>
+          </a:fontRef>
+        </p:style>
+        <p:txBody>
+          <a:bodyPr rtlCol="0" anchor="ctr"/>
+          <a:lstStyle/>
+          <a:p>
+            <a:pPr algn="ctr"/>
+            <a:endParaRPr lang="en-GB"/>
+          </a:p>
+        </p:txBody>
+      </p:sp>
+      <p:sp>
+        <p:nvSpPr>
+          <p:cNvPr id="19" name="Title 1"/>
+          <p:cNvSpPr>
+            <a:spLocks noGrp="1"/>
+          </p:cNvSpPr>
+          <p:nvPr>
+            <p:ph type="title"/>
+          </p:nvPr>
+        </p:nvSpPr>
+        <p:spPr>
+          <a:xfrm>
+            <a:off x="457200" y="274638"/>
+            <a:ext cx="8229600" cy="1143000"/>
+          </a:xfrm>
+        </p:spPr>
+        <p:txBody>
+          <a:bodyPr/>
+          <a:lstStyle/>
+          <a:p>
+            <a:r>
+              <a:rPr lang="en-GB" dirty="0" err="1" smtClean="0"/>
+              <a:t>Pos</a:t>
+            </a:r>
+            <a:r>
+              <a:rPr lang="en-GB" dirty="0" smtClean="0"/>
+              <a:t>/</a:t>
+            </a:r>
+            <a:r>
+              <a:rPr lang="en-GB" dirty="0" err="1"/>
+              <a:t>V</a:t>
+            </a:r>
+            <a:r>
+              <a:rPr lang="en-GB" dirty="0" err="1" smtClean="0"/>
+              <a:t>el</a:t>
+            </a:r>
+            <a:r>
+              <a:rPr lang="en-GB" dirty="0" smtClean="0"/>
+              <a:t> Example – Good</a:t>
+            </a:r>
+            <a:endParaRPr lang="en-GB" dirty="0"/>
+          </a:p>
+        </p:txBody>
+      </p:sp>
+      <p:cxnSp>
+        <p:nvCxnSpPr>
+          <p:cNvPr id="26" name="Straight Arrow Connector 25"/>
+          <p:cNvCxnSpPr>
+            <a:stCxn id="12" idx="1"/>
+            <a:endCxn id="11" idx="1"/>
+          </p:cNvCxnSpPr>
+          <p:nvPr/>
+        </p:nvCxnSpPr>
+        <p:spPr>
+          <a:xfrm flipV="1">
+            <a:off x="2806114" y="2636912"/>
+            <a:ext cx="1690" cy="792088"/>
+          </a:xfrm>
+          <a:prstGeom prst="straightConnector1">
+            <a:avLst/>
+          </a:prstGeom>
+          <a:ln w="57150">
+            <a:solidFill>
+              <a:srgbClr val="FF0000"/>
+            </a:solidFill>
+            <a:headEnd type="triangle" w="med" len="med"/>
+            <a:tailEnd type="triangle" w="med" len="med"/>
+          </a:ln>
+        </p:spPr>
+        <p:style>
+          <a:lnRef idx="1">
+            <a:schemeClr val="accent1"/>
+          </a:lnRef>
+          <a:fillRef idx="0">
+            <a:schemeClr val="accent1"/>
+          </a:fillRef>
+          <a:effectRef idx="0">
+            <a:schemeClr val="accent1"/>
+          </a:effectRef>
+          <a:fontRef idx="minor">
+            <a:schemeClr val="tx1"/>
+          </a:fontRef>
+        </p:style>
+      </p:cxnSp>
+    </p:spTree>
+    <p:extLst>
+      <p:ext uri="{BB962C8B-B14F-4D97-AF65-F5344CB8AC3E}">
+        <p14:creationId xmlns:p14="http://schemas.microsoft.com/office/powerpoint/2010/main" val="2632896379"/>
       </p:ext>
     </p:extLst>
   </p:cSld>

</xml_diff>